<commit_message>
modifications de la présentation
</commit_message>
<xml_diff>
--- a/TPI_Multiplix_presentation.pptx
+++ b/TPI_Multiplix_presentation.pptx
@@ -204,7 +204,7 @@
           <a:p>
             <a:fld id="{7FC9F656-4C67-4261-B370-ABFB3D17CADF}" type="datetimeFigureOut">
               <a:rPr lang="fr-CH" smtClean="0"/>
-              <a:t>13.06.2018</a:t>
+              <a:t>14.06.2018</a:t>
             </a:fld>
             <a:endParaRPr lang="fr-CH"/>
           </a:p>
@@ -473,7 +473,7 @@
 </file>
 
 <file path=ppt/slideLayouts/slideLayout1.xml><?xml version="1.0" encoding="utf-8"?>
-<p:sldLayout xmlns:a="http://schemas.openxmlformats.org/drawingml/2006/main" xmlns:r="http://schemas.openxmlformats.org/officeDocument/2006/relationships" xmlns:p="http://schemas.openxmlformats.org/presentationml/2006/main" type="title" preserve="1">
+<p:sldLayout xmlns:a="http://schemas.openxmlformats.org/drawingml/2006/main" xmlns:r="http://schemas.openxmlformats.org/officeDocument/2006/relationships" xmlns:p="http://schemas.openxmlformats.org/presentationml/2006/main" showMasterSp="0" type="title" preserve="1">
   <p:cSld name="Diapositive de titre">
     <p:spTree>
       <p:nvGrpSpPr>
@@ -655,7 +655,7 @@
           <a:p>
             <a:fld id="{FFF0991E-5E8F-43C1-8D1C-A04ED8953258}" type="datetime1">
               <a:rPr lang="en-US" smtClean="0"/>
-              <a:t>6/13/2018</a:t>
+              <a:t>6/14/2018</a:t>
             </a:fld>
             <a:endParaRPr lang="en-US" dirty="0"/>
           </a:p>
@@ -712,7 +712,7 @@
 </file>
 
 <file path=ppt/slideLayouts/slideLayout10.xml><?xml version="1.0" encoding="utf-8"?>
-<p:sldLayout xmlns:a="http://schemas.openxmlformats.org/drawingml/2006/main" xmlns:r="http://schemas.openxmlformats.org/officeDocument/2006/relationships" xmlns:p="http://schemas.openxmlformats.org/presentationml/2006/main" preserve="1">
+<p:sldLayout xmlns:a="http://schemas.openxmlformats.org/drawingml/2006/main" xmlns:r="http://schemas.openxmlformats.org/officeDocument/2006/relationships" xmlns:p="http://schemas.openxmlformats.org/presentationml/2006/main" showMasterSp="0" preserve="1">
   <p:cSld name="Image panoramique avec légende">
     <p:spTree>
       <p:nvGrpSpPr>
@@ -925,7 +925,7 @@
           <a:p>
             <a:fld id="{325C51C2-FF63-4C32-81C9-33709F656F5E}" type="datetime1">
               <a:rPr lang="en-US" smtClean="0"/>
-              <a:t>6/13/2018</a:t>
+              <a:t>6/14/2018</a:t>
             </a:fld>
             <a:endParaRPr lang="en-US" dirty="0"/>
           </a:p>
@@ -982,7 +982,7 @@
 </file>
 
 <file path=ppt/slideLayouts/slideLayout11.xml><?xml version="1.0" encoding="utf-8"?>
-<p:sldLayout xmlns:a="http://schemas.openxmlformats.org/drawingml/2006/main" xmlns:r="http://schemas.openxmlformats.org/officeDocument/2006/relationships" xmlns:p="http://schemas.openxmlformats.org/presentationml/2006/main" preserve="1">
+<p:sldLayout xmlns:a="http://schemas.openxmlformats.org/drawingml/2006/main" xmlns:r="http://schemas.openxmlformats.org/officeDocument/2006/relationships" xmlns:p="http://schemas.openxmlformats.org/presentationml/2006/main" showMasterSp="0" preserve="1">
   <p:cSld name="Titre et légende">
     <p:spTree>
       <p:nvGrpSpPr>
@@ -1114,7 +1114,7 @@
           <a:p>
             <a:fld id="{7BDFCF69-58ED-4A23-8590-FC3609A014EE}" type="datetime1">
               <a:rPr lang="en-US" smtClean="0"/>
-              <a:t>6/13/2018</a:t>
+              <a:t>6/14/2018</a:t>
             </a:fld>
             <a:endParaRPr lang="en-US" dirty="0"/>
           </a:p>
@@ -1171,7 +1171,7 @@
 </file>
 
 <file path=ppt/slideLayouts/slideLayout12.xml><?xml version="1.0" encoding="utf-8"?>
-<p:sldLayout xmlns:a="http://schemas.openxmlformats.org/drawingml/2006/main" xmlns:r="http://schemas.openxmlformats.org/officeDocument/2006/relationships" xmlns:p="http://schemas.openxmlformats.org/presentationml/2006/main" preserve="1">
+<p:sldLayout xmlns:a="http://schemas.openxmlformats.org/drawingml/2006/main" xmlns:r="http://schemas.openxmlformats.org/officeDocument/2006/relationships" xmlns:p="http://schemas.openxmlformats.org/presentationml/2006/main" showMasterSp="0" preserve="1">
   <p:cSld name="Citation avec légende">
     <p:spTree>
       <p:nvGrpSpPr>
@@ -1377,7 +1377,7 @@
           <a:p>
             <a:fld id="{F55E1292-D83F-432A-A561-58EE3313D34B}" type="datetime1">
               <a:rPr lang="en-US" smtClean="0"/>
-              <a:t>6/13/2018</a:t>
+              <a:t>6/14/2018</a:t>
             </a:fld>
             <a:endParaRPr lang="en-US" dirty="0"/>
           </a:p>
@@ -1522,7 +1522,7 @@
 </file>
 
 <file path=ppt/slideLayouts/slideLayout13.xml><?xml version="1.0" encoding="utf-8"?>
-<p:sldLayout xmlns:a="http://schemas.openxmlformats.org/drawingml/2006/main" xmlns:r="http://schemas.openxmlformats.org/officeDocument/2006/relationships" xmlns:p="http://schemas.openxmlformats.org/presentationml/2006/main" preserve="1">
+<p:sldLayout xmlns:a="http://schemas.openxmlformats.org/drawingml/2006/main" xmlns:r="http://schemas.openxmlformats.org/officeDocument/2006/relationships" xmlns:p="http://schemas.openxmlformats.org/presentationml/2006/main" showMasterSp="0" preserve="1">
   <p:cSld name="Carte nom">
     <p:spTree>
       <p:nvGrpSpPr>
@@ -1704,7 +1704,7 @@
           <a:p>
             <a:fld id="{EF4EE311-FCA4-4D61-9C7F-ABE9539F2810}" type="datetime1">
               <a:rPr lang="en-US" smtClean="0"/>
-              <a:t>6/13/2018</a:t>
+              <a:t>6/14/2018</a:t>
             </a:fld>
             <a:endParaRPr lang="en-US" dirty="0"/>
           </a:p>
@@ -1761,7 +1761,7 @@
 </file>
 
 <file path=ppt/slideLayouts/slideLayout14.xml><?xml version="1.0" encoding="utf-8"?>
-<p:sldLayout xmlns:a="http://schemas.openxmlformats.org/drawingml/2006/main" xmlns:r="http://schemas.openxmlformats.org/officeDocument/2006/relationships" xmlns:p="http://schemas.openxmlformats.org/presentationml/2006/main" preserve="1">
+<p:sldLayout xmlns:a="http://schemas.openxmlformats.org/drawingml/2006/main" xmlns:r="http://schemas.openxmlformats.org/officeDocument/2006/relationships" xmlns:p="http://schemas.openxmlformats.org/presentationml/2006/main" showMasterSp="0" preserve="1">
   <p:cSld name="3 colonnes">
     <p:spTree>
       <p:nvGrpSpPr>
@@ -2309,7 +2309,7 @@
           <a:p>
             <a:fld id="{CFAF7955-B6AA-41E5-A4F0-CFFF6C7B14A4}" type="datetime1">
               <a:rPr lang="en-US" smtClean="0"/>
-              <a:t>6/13/2018</a:t>
+              <a:t>6/14/2018</a:t>
             </a:fld>
             <a:endParaRPr lang="en-US" dirty="0"/>
           </a:p>
@@ -2366,7 +2366,7 @@
 </file>
 
 <file path=ppt/slideLayouts/slideLayout15.xml><?xml version="1.0" encoding="utf-8"?>
-<p:sldLayout xmlns:a="http://schemas.openxmlformats.org/drawingml/2006/main" xmlns:r="http://schemas.openxmlformats.org/officeDocument/2006/relationships" xmlns:p="http://schemas.openxmlformats.org/presentationml/2006/main" preserve="1">
+<p:sldLayout xmlns:a="http://schemas.openxmlformats.org/drawingml/2006/main" xmlns:r="http://schemas.openxmlformats.org/officeDocument/2006/relationships" xmlns:p="http://schemas.openxmlformats.org/presentationml/2006/main" showMasterSp="0" preserve="1">
   <p:cSld name="3 colonnes d’image">
     <p:spTree>
       <p:nvGrpSpPr>
@@ -3151,7 +3151,7 @@
           <a:p>
             <a:fld id="{B20DB41A-1379-4832-8957-D3978FB3DA1E}" type="datetime1">
               <a:rPr lang="en-US" smtClean="0"/>
-              <a:t>6/13/2018</a:t>
+              <a:t>6/14/2018</a:t>
             </a:fld>
             <a:endParaRPr lang="en-US" dirty="0"/>
           </a:p>
@@ -3208,7 +3208,7 @@
 </file>
 
 <file path=ppt/slideLayouts/slideLayout16.xml><?xml version="1.0" encoding="utf-8"?>
-<p:sldLayout xmlns:a="http://schemas.openxmlformats.org/drawingml/2006/main" xmlns:r="http://schemas.openxmlformats.org/officeDocument/2006/relationships" xmlns:p="http://schemas.openxmlformats.org/presentationml/2006/main" type="vertTx" preserve="1">
+<p:sldLayout xmlns:a="http://schemas.openxmlformats.org/drawingml/2006/main" xmlns:r="http://schemas.openxmlformats.org/officeDocument/2006/relationships" xmlns:p="http://schemas.openxmlformats.org/presentationml/2006/main" showMasterSp="0" type="vertTx" preserve="1">
   <p:cSld name="Titre et texte vertical">
     <p:spTree>
       <p:nvGrpSpPr>
@@ -3316,7 +3316,7 @@
           <a:p>
             <a:fld id="{63DE1AD8-860D-4793-B6C2-D61055E49CCC}" type="datetime1">
               <a:rPr lang="en-US" smtClean="0"/>
-              <a:t>6/13/2018</a:t>
+              <a:t>6/14/2018</a:t>
             </a:fld>
             <a:endParaRPr lang="en-US" dirty="0"/>
           </a:p>
@@ -3373,7 +3373,7 @@
 </file>
 
 <file path=ppt/slideLayouts/slideLayout17.xml><?xml version="1.0" encoding="utf-8"?>
-<p:sldLayout xmlns:a="http://schemas.openxmlformats.org/drawingml/2006/main" xmlns:r="http://schemas.openxmlformats.org/officeDocument/2006/relationships" xmlns:p="http://schemas.openxmlformats.org/presentationml/2006/main" type="vertTitleAndTx" preserve="1">
+<p:sldLayout xmlns:a="http://schemas.openxmlformats.org/drawingml/2006/main" xmlns:r="http://schemas.openxmlformats.org/officeDocument/2006/relationships" xmlns:p="http://schemas.openxmlformats.org/presentationml/2006/main" showMasterSp="0" type="vertTitleAndTx" preserve="1">
   <p:cSld name="Titre vertical et texte">
     <p:spTree>
       <p:nvGrpSpPr>
@@ -3491,7 +3491,7 @@
           <a:p>
             <a:fld id="{2907CFD0-5F18-4F41-A38D-971BA21B2BB9}" type="datetime1">
               <a:rPr lang="en-US" smtClean="0"/>
-              <a:t>6/13/2018</a:t>
+              <a:t>6/14/2018</a:t>
             </a:fld>
             <a:endParaRPr lang="en-US" dirty="0"/>
           </a:p>
@@ -3548,7 +3548,7 @@
 </file>
 
 <file path=ppt/slideLayouts/slideLayout2.xml><?xml version="1.0" encoding="utf-8"?>
-<p:sldLayout xmlns:a="http://schemas.openxmlformats.org/drawingml/2006/main" xmlns:r="http://schemas.openxmlformats.org/officeDocument/2006/relationships" xmlns:p="http://schemas.openxmlformats.org/presentationml/2006/main" type="obj" preserve="1">
+<p:sldLayout xmlns:a="http://schemas.openxmlformats.org/drawingml/2006/main" xmlns:r="http://schemas.openxmlformats.org/officeDocument/2006/relationships" xmlns:p="http://schemas.openxmlformats.org/presentationml/2006/main" showMasterSp="0" type="obj" preserve="1">
   <p:cSld name="Titre et contenu">
     <p:spTree>
       <p:nvGrpSpPr>
@@ -3656,7 +3656,7 @@
           <a:p>
             <a:fld id="{B9B54062-8C55-4633-8FD9-80306C493CED}" type="datetime1">
               <a:rPr lang="en-US" smtClean="0"/>
-              <a:t>6/13/2018</a:t>
+              <a:t>6/14/2018</a:t>
             </a:fld>
             <a:endParaRPr lang="en-US" dirty="0"/>
           </a:p>
@@ -3713,7 +3713,7 @@
 </file>
 
 <file path=ppt/slideLayouts/slideLayout3.xml><?xml version="1.0" encoding="utf-8"?>
-<p:sldLayout xmlns:a="http://schemas.openxmlformats.org/drawingml/2006/main" xmlns:r="http://schemas.openxmlformats.org/officeDocument/2006/relationships" xmlns:p="http://schemas.openxmlformats.org/presentationml/2006/main" type="secHead" preserve="1">
+<p:sldLayout xmlns:a="http://schemas.openxmlformats.org/drawingml/2006/main" xmlns:r="http://schemas.openxmlformats.org/officeDocument/2006/relationships" xmlns:p="http://schemas.openxmlformats.org/presentationml/2006/main" showMasterSp="0" type="secHead" preserve="1">
   <p:cSld name="Titre de section">
     <p:spTree>
       <p:nvGrpSpPr>
@@ -3895,7 +3895,7 @@
           <a:p>
             <a:fld id="{23DD96B0-7C9F-4C4A-84A6-4E557E85ABF2}" type="datetime1">
               <a:rPr lang="en-US" smtClean="0"/>
-              <a:t>6/13/2018</a:t>
+              <a:t>6/14/2018</a:t>
             </a:fld>
             <a:endParaRPr lang="en-US" dirty="0"/>
           </a:p>
@@ -3952,7 +3952,7 @@
 </file>
 
 <file path=ppt/slideLayouts/slideLayout4.xml><?xml version="1.0" encoding="utf-8"?>
-<p:sldLayout xmlns:a="http://schemas.openxmlformats.org/drawingml/2006/main" xmlns:r="http://schemas.openxmlformats.org/officeDocument/2006/relationships" xmlns:p="http://schemas.openxmlformats.org/presentationml/2006/main" type="twoObj" preserve="1">
+<p:sldLayout xmlns:a="http://schemas.openxmlformats.org/drawingml/2006/main" xmlns:r="http://schemas.openxmlformats.org/officeDocument/2006/relationships" xmlns:p="http://schemas.openxmlformats.org/presentationml/2006/main" showMasterSp="0" type="twoObj" preserve="1">
   <p:cSld name="Deux contenus">
     <p:spTree>
       <p:nvGrpSpPr>
@@ -4182,7 +4182,7 @@
           <a:p>
             <a:fld id="{C7F70A21-362C-4CAA-8B67-E996FC463D1E}" type="datetime1">
               <a:rPr lang="en-US" smtClean="0"/>
-              <a:t>6/13/2018</a:t>
+              <a:t>6/14/2018</a:t>
             </a:fld>
             <a:endParaRPr lang="en-US" dirty="0"/>
           </a:p>
@@ -4239,7 +4239,7 @@
 </file>
 
 <file path=ppt/slideLayouts/slideLayout5.xml><?xml version="1.0" encoding="utf-8"?>
-<p:sldLayout xmlns:a="http://schemas.openxmlformats.org/drawingml/2006/main" xmlns:r="http://schemas.openxmlformats.org/officeDocument/2006/relationships" xmlns:p="http://schemas.openxmlformats.org/presentationml/2006/main" type="twoTxTwoObj" preserve="1">
+<p:sldLayout xmlns:a="http://schemas.openxmlformats.org/drawingml/2006/main" xmlns:r="http://schemas.openxmlformats.org/officeDocument/2006/relationships" xmlns:p="http://schemas.openxmlformats.org/presentationml/2006/main" showMasterSp="0" type="twoTxTwoObj" preserve="1">
   <p:cSld name="Comparaison">
     <p:spTree>
       <p:nvGrpSpPr>
@@ -4615,7 +4615,7 @@
           <a:p>
             <a:fld id="{EC1CB69A-A7BE-4ECC-88C3-18AEDAFB3DE2}" type="datetime1">
               <a:rPr lang="en-US" smtClean="0"/>
-              <a:t>6/13/2018</a:t>
+              <a:t>6/14/2018</a:t>
             </a:fld>
             <a:endParaRPr lang="en-US" dirty="0"/>
           </a:p>
@@ -4672,7 +4672,7 @@
 </file>
 
 <file path=ppt/slideLayouts/slideLayout6.xml><?xml version="1.0" encoding="utf-8"?>
-<p:sldLayout xmlns:a="http://schemas.openxmlformats.org/drawingml/2006/main" xmlns:r="http://schemas.openxmlformats.org/officeDocument/2006/relationships" xmlns:p="http://schemas.openxmlformats.org/presentationml/2006/main" type="titleOnly" preserve="1">
+<p:sldLayout xmlns:a="http://schemas.openxmlformats.org/drawingml/2006/main" xmlns:r="http://schemas.openxmlformats.org/officeDocument/2006/relationships" xmlns:p="http://schemas.openxmlformats.org/presentationml/2006/main" showMasterSp="0" type="titleOnly" preserve="1">
   <p:cSld name="Titre seul">
     <p:spTree>
       <p:nvGrpSpPr>
@@ -4728,7 +4728,7 @@
           <a:p>
             <a:fld id="{93BAAE6F-FAF9-4CFE-836E-2F24EBA3EE38}" type="datetime1">
               <a:rPr lang="en-US" smtClean="0"/>
-              <a:t>6/13/2018</a:t>
+              <a:t>6/14/2018</a:t>
             </a:fld>
             <a:endParaRPr lang="en-US" dirty="0"/>
           </a:p>
@@ -4785,7 +4785,7 @@
 </file>
 
 <file path=ppt/slideLayouts/slideLayout7.xml><?xml version="1.0" encoding="utf-8"?>
-<p:sldLayout xmlns:a="http://schemas.openxmlformats.org/drawingml/2006/main" xmlns:r="http://schemas.openxmlformats.org/officeDocument/2006/relationships" xmlns:p="http://schemas.openxmlformats.org/presentationml/2006/main" type="blank" preserve="1">
+<p:sldLayout xmlns:a="http://schemas.openxmlformats.org/drawingml/2006/main" xmlns:r="http://schemas.openxmlformats.org/officeDocument/2006/relationships" xmlns:p="http://schemas.openxmlformats.org/presentationml/2006/main" showMasterSp="0" type="blank" preserve="1">
   <p:cSld name="Vide">
     <p:spTree>
       <p:nvGrpSpPr>
@@ -4818,7 +4818,7 @@
           <a:p>
             <a:fld id="{7204742A-3B12-4658-BC9E-5CD9F2F701F2}" type="datetime1">
               <a:rPr lang="en-US" smtClean="0"/>
-              <a:t>6/13/2018</a:t>
+              <a:t>6/14/2018</a:t>
             </a:fld>
             <a:endParaRPr lang="en-US" dirty="0"/>
           </a:p>
@@ -4875,7 +4875,7 @@
 </file>
 
 <file path=ppt/slideLayouts/slideLayout8.xml><?xml version="1.0" encoding="utf-8"?>
-<p:sldLayout xmlns:a="http://schemas.openxmlformats.org/drawingml/2006/main" xmlns:r="http://schemas.openxmlformats.org/officeDocument/2006/relationships" xmlns:p="http://schemas.openxmlformats.org/presentationml/2006/main" type="objTx" preserve="1">
+<p:sldLayout xmlns:a="http://schemas.openxmlformats.org/drawingml/2006/main" xmlns:r="http://schemas.openxmlformats.org/officeDocument/2006/relationships" xmlns:p="http://schemas.openxmlformats.org/presentationml/2006/main" showMasterSp="0" type="objTx" preserve="1">
   <p:cSld name="Contenu avec légende">
     <p:spTree>
       <p:nvGrpSpPr>
@@ -5092,7 +5092,7 @@
           <a:p>
             <a:fld id="{5A7A27F9-DEDB-496E-9804-5489745303D1}" type="datetime1">
               <a:rPr lang="en-US" smtClean="0"/>
-              <a:t>6/13/2018</a:t>
+              <a:t>6/14/2018</a:t>
             </a:fld>
             <a:endParaRPr lang="en-US" dirty="0"/>
           </a:p>
@@ -5149,7 +5149,7 @@
 </file>
 
 <file path=ppt/slideLayouts/slideLayout9.xml><?xml version="1.0" encoding="utf-8"?>
-<p:sldLayout xmlns:a="http://schemas.openxmlformats.org/drawingml/2006/main" xmlns:r="http://schemas.openxmlformats.org/officeDocument/2006/relationships" xmlns:p="http://schemas.openxmlformats.org/presentationml/2006/main" type="picTx" preserve="1">
+<p:sldLayout xmlns:a="http://schemas.openxmlformats.org/drawingml/2006/main" xmlns:r="http://schemas.openxmlformats.org/officeDocument/2006/relationships" xmlns:p="http://schemas.openxmlformats.org/presentationml/2006/main" showMasterSp="0" type="picTx" preserve="1">
   <p:cSld name="Image avec légende">
     <p:spTree>
       <p:nvGrpSpPr>
@@ -5362,7 +5362,7 @@
           <a:p>
             <a:fld id="{1C20149E-75DB-4F1B-B435-795B47EF37D9}" type="datetime1">
               <a:rPr lang="en-US" smtClean="0"/>
-              <a:t>6/13/2018</a:t>
+              <a:t>6/14/2018</a:t>
             </a:fld>
             <a:endParaRPr lang="en-US" dirty="0"/>
           </a:p>
@@ -5422,9 +5422,31 @@
 <p:sldMaster xmlns:a="http://schemas.openxmlformats.org/drawingml/2006/main" xmlns:r="http://schemas.openxmlformats.org/officeDocument/2006/relationships" xmlns:p="http://schemas.openxmlformats.org/presentationml/2006/main">
   <p:cSld>
     <p:bg>
-      <p:bgRef idx="1003">
-        <a:schemeClr val="bg2"/>
-      </p:bgRef>
+      <p:bgPr>
+        <a:blipFill dpi="0" rotWithShape="1">
+          <a:blip r:embed="rId19">
+            <a:extLst>
+              <a:ext uri="{BEBA8EAE-BF5A-486C-A8C5-ECC9F3942E4B}">
+                <a14:imgProps xmlns:a14="http://schemas.microsoft.com/office/drawing/2010/main">
+                  <a14:imgLayer r:embed="rId20">
+                    <a14:imgEffect>
+                      <a14:sharpenSoften amount="-100000"/>
+                    </a14:imgEffect>
+                    <a14:imgEffect>
+                      <a14:brightnessContrast bright="-35000"/>
+                    </a14:imgEffect>
+                  </a14:imgLayer>
+                </a14:imgProps>
+              </a:ext>
+            </a:extLst>
+          </a:blip>
+          <a:srcRect/>
+          <a:stretch>
+            <a:fillRect t="-6000" b="-6000"/>
+          </a:stretch>
+        </a:blipFill>
+        <a:effectLst/>
+      </p:bgPr>
     </p:bg>
     <p:spTree>
       <p:nvGrpSpPr>
@@ -5449,7 +5471,7 @@
           <p:nvPr/>
         </p:nvPicPr>
         <p:blipFill rotWithShape="1">
-          <a:blip r:embed="rId19">
+          <a:blip r:embed="rId21">
             <a:extLst>
               <a:ext uri="{28A0092B-C50C-407E-A947-70E740481C1C}">
                 <a14:useLocalDpi xmlns:a14="http://schemas.microsoft.com/office/drawing/2010/main" val="0"/>
@@ -5478,7 +5500,7 @@
           <p:nvPr/>
         </p:nvPicPr>
         <p:blipFill rotWithShape="1">
-          <a:blip r:embed="rId20">
+          <a:blip r:embed="rId22">
             <a:extLst>
               <a:ext uri="{28A0092B-C50C-407E-A947-70E740481C1C}">
                 <a14:useLocalDpi xmlns:a14="http://schemas.microsoft.com/office/drawing/2010/main" val="0"/>
@@ -5570,7 +5592,7 @@
           <p:nvPr/>
         </p:nvPicPr>
         <p:blipFill rotWithShape="1">
-          <a:blip r:embed="rId21">
+          <a:blip r:embed="rId23">
             <a:extLst>
               <a:ext uri="{28A0092B-C50C-407E-A947-70E740481C1C}">
                 <a14:useLocalDpi xmlns:a14="http://schemas.microsoft.com/office/drawing/2010/main" val="0"/>
@@ -5599,7 +5621,7 @@
           <p:nvPr/>
         </p:nvPicPr>
         <p:blipFill rotWithShape="1">
-          <a:blip r:embed="rId22">
+          <a:blip r:embed="rId24">
             <a:extLst>
               <a:ext uri="{28A0092B-C50C-407E-A947-70E740481C1C}">
                 <a14:useLocalDpi xmlns:a14="http://schemas.microsoft.com/office/drawing/2010/main" val="0"/>
@@ -5786,7 +5808,7 @@
           <a:p>
             <a:fld id="{07AB69C2-87B5-4F58-A057-C3828DDD4531}" type="datetime1">
               <a:rPr lang="en-US" smtClean="0"/>
-              <a:t>6/13/2018</a:t>
+              <a:t>6/14/2018</a:t>
             </a:fld>
             <a:endParaRPr lang="en-US" dirty="0"/>
           </a:p>
@@ -6267,7 +6289,7 @@
 </file>
 
 <file path=ppt/slides/slide1.xml><?xml version="1.0" encoding="utf-8"?>
-<p:sld xmlns:a="http://schemas.openxmlformats.org/drawingml/2006/main" xmlns:r="http://schemas.openxmlformats.org/officeDocument/2006/relationships" xmlns:p="http://schemas.openxmlformats.org/presentationml/2006/main">
+<p:sld xmlns:a="http://schemas.openxmlformats.org/drawingml/2006/main" xmlns:r="http://schemas.openxmlformats.org/officeDocument/2006/relationships" xmlns:p="http://schemas.openxmlformats.org/presentationml/2006/main" showMasterSp="0">
   <p:cSld>
     <p:spTree>
       <p:nvGrpSpPr>
@@ -6283,6 +6305,70 @@
           <a:chExt cx="0" cy="0"/>
         </a:xfrm>
       </p:grpSpPr>
+      <p:pic>
+        <p:nvPicPr>
+          <p:cNvPr id="8" name="Image 7"/>
+          <p:cNvPicPr>
+            <a:picLocks noChangeAspect="1"/>
+          </p:cNvPicPr>
+          <p:nvPr/>
+        </p:nvPicPr>
+        <p:blipFill>
+          <a:blip r:embed="rId2"/>
+          <a:stretch>
+            <a:fillRect/>
+          </a:stretch>
+        </p:blipFill>
+        <p:spPr>
+          <a:xfrm>
+            <a:off x="1154955" y="451946"/>
+            <a:ext cx="5352937" cy="1260955"/>
+          </a:xfrm>
+          <a:prstGeom prst="rect">
+            <a:avLst/>
+          </a:prstGeom>
+          <a:effectLst>
+            <a:outerShdw dist="38100" dir="5400000" sx="1000" sy="1000" algn="t" rotWithShape="0">
+              <a:prstClr val="black">
+                <a:alpha val="0"/>
+              </a:prstClr>
+            </a:outerShdw>
+            <a:softEdge rad="0"/>
+          </a:effectLst>
+        </p:spPr>
+      </p:pic>
+      <p:pic>
+        <p:nvPicPr>
+          <p:cNvPr id="7" name="Image 6"/>
+          <p:cNvPicPr>
+            <a:picLocks noChangeAspect="1"/>
+          </p:cNvPicPr>
+          <p:nvPr/>
+        </p:nvPicPr>
+        <p:blipFill>
+          <a:blip r:embed="rId2"/>
+          <a:stretch>
+            <a:fillRect/>
+          </a:stretch>
+        </p:blipFill>
+        <p:spPr>
+          <a:xfrm>
+            <a:off x="11044719" y="0"/>
+            <a:ext cx="1162519" cy="1249709"/>
+          </a:xfrm>
+          <a:prstGeom prst="rect">
+            <a:avLst/>
+          </a:prstGeom>
+          <a:effectLst>
+            <a:outerShdw dist="38100" dir="5400000" sx="1000" sy="1000" algn="t" rotWithShape="0">
+              <a:prstClr val="black">
+                <a:alpha val="0"/>
+              </a:prstClr>
+            </a:outerShdw>
+            <a:softEdge rad="0"/>
+          </a:effectLst>
+        </p:spPr>
+      </p:pic>
       <p:sp>
         <p:nvSpPr>
           <p:cNvPr id="2" name="Titre 1"/>
@@ -6312,6 +6398,7 @@
                     </a:srgbClr>
                   </a:outerShdw>
                 </a:effectLst>
+                <a:latin typeface="Raleway" panose="020B0503030101060003" pitchFamily="34" charset="0"/>
               </a:rPr>
               <a:t>TPI </a:t>
             </a:r>
@@ -6324,6 +6411,7 @@
                     </a:srgbClr>
                   </a:outerShdw>
                 </a:effectLst>
+                <a:latin typeface="Raleway" panose="020B0503030101060003" pitchFamily="34" charset="0"/>
               </a:rPr>
               <a:t>Multiplix</a:t>
             </a:r>
@@ -6335,6 +6423,7 @@
                   </a:srgbClr>
                 </a:outerShdw>
               </a:effectLst>
+              <a:latin typeface="Raleway" panose="020B0503030101060003" pitchFamily="34" charset="0"/>
             </a:endParaRPr>
           </a:p>
         </p:txBody>
@@ -6351,7 +6440,7 @@
         </p:nvSpPr>
         <p:spPr>
           <a:xfrm>
-            <a:off x="1154955" y="4711471"/>
+            <a:off x="1154955" y="4917421"/>
             <a:ext cx="10035784" cy="1582239"/>
           </a:xfrm>
         </p:spPr>
@@ -6374,6 +6463,7 @@
                     </a:srgbClr>
                   </a:outerShdw>
                 </a:effectLst>
+                <a:latin typeface="Raleway" panose="020B0503030101060003" pitchFamily="34" charset="0"/>
               </a:rPr>
               <a:t>Gerardi Alexandre</a:t>
             </a:r>
@@ -6392,6 +6482,7 @@
                     </a:srgbClr>
                   </a:outerShdw>
                 </a:effectLst>
+                <a:latin typeface="Raleway" panose="020B0503030101060003" pitchFamily="34" charset="0"/>
               </a:rPr>
               <a:t>CPNV Ste-Croix</a:t>
             </a:r>
@@ -6410,6 +6501,7 @@
                     </a:srgbClr>
                   </a:outerShdw>
                 </a:effectLst>
+                <a:latin typeface="Raleway" panose="020B0503030101060003" pitchFamily="34" charset="0"/>
               </a:rPr>
               <a:t>Si-C4a</a:t>
             </a:r>
@@ -6424,6 +6516,7 @@
                   </a:srgbClr>
                 </a:outerShdw>
               </a:effectLst>
+              <a:latin typeface="Raleway" panose="020B0503030101060003" pitchFamily="34" charset="0"/>
             </a:endParaRPr>
           </a:p>
         </p:txBody>
@@ -6437,11 +6530,11 @@
           <p:nvPr/>
         </p:nvPicPr>
         <p:blipFill>
-          <a:blip r:embed="rId2">
+          <a:blip r:embed="rId3">
             <a:extLst>
               <a:ext uri="{BEBA8EAE-BF5A-486C-A8C5-ECC9F3942E4B}">
                 <a14:imgProps xmlns:a14="http://schemas.microsoft.com/office/drawing/2010/main">
-                  <a14:imgLayer r:embed="rId3">
+                  <a14:imgLayer r:embed="rId4">
                     <a14:imgEffect>
                       <a14:sharpenSoften amount="100000"/>
                     </a14:imgEffect>
@@ -6462,7 +6555,7 @@
         </p:blipFill>
         <p:spPr>
           <a:xfrm>
-            <a:off x="3548709" y="1812011"/>
+            <a:off x="3548709" y="1968533"/>
             <a:ext cx="5248275" cy="2800350"/>
           </a:xfrm>
           <a:prstGeom prst="roundRect">
@@ -6510,13 +6603,18 @@
             <p:ph type="sldNum" sz="quarter" idx="12"/>
           </p:nvPr>
         </p:nvSpPr>
-        <p:spPr/>
+        <p:spPr>
+          <a:xfrm>
+            <a:off x="11044719" y="0"/>
+            <a:ext cx="1147281" cy="1219633"/>
+          </a:xfrm>
+        </p:spPr>
         <p:txBody>
           <a:bodyPr/>
           <a:lstStyle/>
           <a:p>
             <a:r>
-              <a:rPr lang="en-US" sz="1900" dirty="0" smtClean="0">
+              <a:rPr lang="en-US" sz="3000" b="1" dirty="0" smtClean="0">
                 <a:effectLst>
                   <a:outerShdw blurRad="38100" dist="38100" dir="2700000" algn="tl">
                     <a:srgbClr val="000000">
@@ -6524,6 +6622,7 @@
                     </a:srgbClr>
                   </a:outerShdw>
                 </a:effectLst>
+                <a:latin typeface="Raleway" panose="020B0503030101060003" pitchFamily="34" charset="0"/>
               </a:rPr>
               <a:t>12.5%</a:t>
             </a:r>
@@ -6676,7 +6775,7 @@
 </file>
 
 <file path=ppt/slides/slide2.xml><?xml version="1.0" encoding="utf-8"?>
-<p:sld xmlns:a="http://schemas.openxmlformats.org/drawingml/2006/main" xmlns:r="http://schemas.openxmlformats.org/officeDocument/2006/relationships" xmlns:p="http://schemas.openxmlformats.org/presentationml/2006/main">
+<p:sld xmlns:a="http://schemas.openxmlformats.org/drawingml/2006/main" xmlns:r="http://schemas.openxmlformats.org/officeDocument/2006/relationships" xmlns:p="http://schemas.openxmlformats.org/presentationml/2006/main" showMasterSp="0">
   <p:cSld>
     <p:spTree>
       <p:nvGrpSpPr>
@@ -6694,6 +6793,146 @@
       </p:grpSpPr>
       <p:pic>
         <p:nvPicPr>
+          <p:cNvPr id="9" name="Image 8"/>
+          <p:cNvPicPr>
+            <a:picLocks noChangeAspect="1"/>
+          </p:cNvPicPr>
+          <p:nvPr/>
+        </p:nvPicPr>
+        <p:blipFill>
+          <a:blip r:embed="rId2"/>
+          <a:stretch>
+            <a:fillRect/>
+          </a:stretch>
+        </p:blipFill>
+        <p:spPr>
+          <a:xfrm>
+            <a:off x="6591839" y="3247501"/>
+            <a:ext cx="3104129" cy="1755383"/>
+          </a:xfrm>
+          <a:prstGeom prst="rect">
+            <a:avLst/>
+          </a:prstGeom>
+          <a:effectLst>
+            <a:reflection blurRad="6350" endPos="0" dir="5400000" sy="-100000" algn="bl" rotWithShape="0"/>
+          </a:effectLst>
+        </p:spPr>
+      </p:pic>
+      <p:pic>
+        <p:nvPicPr>
+          <p:cNvPr id="12" name="Image 11"/>
+          <p:cNvPicPr>
+            <a:picLocks noChangeAspect="1"/>
+          </p:cNvPicPr>
+          <p:nvPr/>
+        </p:nvPicPr>
+        <p:blipFill>
+          <a:blip r:embed="rId3"/>
+          <a:stretch>
+            <a:fillRect/>
+          </a:stretch>
+        </p:blipFill>
+        <p:spPr>
+          <a:xfrm>
+            <a:off x="9343072" y="4376111"/>
+            <a:ext cx="1321503" cy="1531530"/>
+          </a:xfrm>
+          <a:prstGeom prst="rect">
+            <a:avLst/>
+          </a:prstGeom>
+          <a:effectLst>
+            <a:reflection blurRad="6350" endPos="0" dir="5400000" sy="-100000" algn="bl" rotWithShape="0"/>
+          </a:effectLst>
+        </p:spPr>
+      </p:pic>
+      <p:pic>
+        <p:nvPicPr>
+          <p:cNvPr id="13" name="Image 12"/>
+          <p:cNvPicPr>
+            <a:picLocks noChangeAspect="1"/>
+          </p:cNvPicPr>
+          <p:nvPr/>
+        </p:nvPicPr>
+        <p:blipFill>
+          <a:blip r:embed="rId3"/>
+          <a:stretch>
+            <a:fillRect/>
+          </a:stretch>
+        </p:blipFill>
+        <p:spPr>
+          <a:xfrm>
+            <a:off x="9052496" y="5269091"/>
+            <a:ext cx="612650" cy="862403"/>
+          </a:xfrm>
+          <a:prstGeom prst="rect">
+            <a:avLst/>
+          </a:prstGeom>
+          <a:effectLst>
+            <a:reflection blurRad="6350" endPos="0" dir="5400000" sy="-100000" algn="bl" rotWithShape="0"/>
+          </a:effectLst>
+        </p:spPr>
+      </p:pic>
+      <p:pic>
+        <p:nvPicPr>
+          <p:cNvPr id="10" name="Image 9"/>
+          <p:cNvPicPr>
+            <a:picLocks noChangeAspect="1"/>
+          </p:cNvPicPr>
+          <p:nvPr/>
+        </p:nvPicPr>
+        <p:blipFill>
+          <a:blip r:embed="rId2"/>
+          <a:stretch>
+            <a:fillRect/>
+          </a:stretch>
+        </p:blipFill>
+        <p:spPr>
+          <a:xfrm>
+            <a:off x="5235457" y="4301770"/>
+            <a:ext cx="2521531" cy="1308650"/>
+          </a:xfrm>
+          <a:prstGeom prst="rect">
+            <a:avLst/>
+          </a:prstGeom>
+          <a:effectLst>
+            <a:reflection blurRad="6350" endPos="0" dir="5400000" sy="-100000" algn="bl" rotWithShape="0"/>
+          </a:effectLst>
+        </p:spPr>
+      </p:pic>
+      <p:pic>
+        <p:nvPicPr>
+          <p:cNvPr id="8" name="Image 7"/>
+          <p:cNvPicPr>
+            <a:picLocks noChangeAspect="1"/>
+          </p:cNvPicPr>
+          <p:nvPr/>
+        </p:nvPicPr>
+        <p:blipFill>
+          <a:blip r:embed="rId4"/>
+          <a:stretch>
+            <a:fillRect/>
+          </a:stretch>
+        </p:blipFill>
+        <p:spPr>
+          <a:xfrm>
+            <a:off x="630873" y="452718"/>
+            <a:ext cx="4970857" cy="796991"/>
+          </a:xfrm>
+          <a:prstGeom prst="rect">
+            <a:avLst/>
+          </a:prstGeom>
+          <a:effectLst>
+            <a:outerShdw dist="38100" dir="5400000" sx="1000" sy="1000" algn="t" rotWithShape="0">
+              <a:prstClr val="black">
+                <a:alpha val="0"/>
+              </a:prstClr>
+            </a:outerShdw>
+            <a:softEdge rad="0"/>
+          </a:effectLst>
+        </p:spPr>
+      </p:pic>
+      <p:pic>
+        <p:nvPicPr>
           <p:cNvPr id="6" name="Image 5"/>
           <p:cNvPicPr>
             <a:picLocks noChangeAspect="1"/>
@@ -6701,7 +6940,7 @@
           <p:nvPr/>
         </p:nvPicPr>
         <p:blipFill>
-          <a:blip r:embed="rId2">
+          <a:blip r:embed="rId5">
             <a:duotone>
               <a:schemeClr val="bg2">
                 <a:shade val="45000"/>
@@ -6712,7 +6951,7 @@
             <a:extLst>
               <a:ext uri="{BEBA8EAE-BF5A-486C-A8C5-ECC9F3942E4B}">
                 <a14:imgProps xmlns:a14="http://schemas.microsoft.com/office/drawing/2010/main">
-                  <a14:imgLayer r:embed="rId3">
+                  <a14:imgLayer r:embed="rId6">
                     <a14:imgEffect>
                       <a14:colorTemperature colorTemp="11500"/>
                     </a14:imgEffect>
@@ -6743,7 +6982,7 @@
             <a:glow rad="139700">
               <a:schemeClr val="bg1"/>
             </a:glow>
-            <a:reflection blurRad="241300" stA="40000" endPos="45000" dist="50800" dir="5400000" sy="-100000" algn="bl" rotWithShape="0"/>
+            <a:reflection blurRad="6350" endPos="0" dir="5400000" sy="-100000" algn="bl" rotWithShape="0"/>
           </a:effectLst>
         </p:spPr>
       </p:pic>
@@ -6771,6 +7010,7 @@
                     </a:srgbClr>
                   </a:outerShdw>
                 </a:effectLst>
+                <a:latin typeface="Raleway" panose="020B0503030101060003" pitchFamily="34" charset="0"/>
               </a:rPr>
               <a:t>Table des matières</a:t>
             </a:r>
@@ -6782,6 +7022,7 @@
                   </a:srgbClr>
                 </a:outerShdw>
               </a:effectLst>
+              <a:latin typeface="Raleway" panose="020B0503030101060003" pitchFamily="34" charset="0"/>
             </a:endParaRPr>
           </a:p>
         </p:txBody>
@@ -6796,15 +7037,28 @@
             <p:ph idx="1"/>
           </p:nvPr>
         </p:nvSpPr>
-        <p:spPr/>
+        <p:spPr>
+          <a:xfrm>
+            <a:off x="1103312" y="1846971"/>
+            <a:ext cx="8946541" cy="4195481"/>
+          </a:xfrm>
+        </p:spPr>
         <p:txBody>
           <a:bodyPr>
             <a:normAutofit/>
           </a:bodyPr>
           <a:lstStyle/>
           <a:p>
-            <a:r>
-              <a:rPr lang="fr-CH" sz="2800" b="1" dirty="0" smtClean="0">
+            <a:pPr>
+              <a:buClr>
+                <a:srgbClr val="009A9C"/>
+              </a:buClr>
+              <a:buSzPct val="100000"/>
+              <a:buFont typeface="Wingdings" panose="05000000000000000000" pitchFamily="2" charset="2"/>
+              <a:buChar char="§"/>
+            </a:pPr>
+            <a:r>
+              <a:rPr lang="fr-CH" sz="3200" b="1" dirty="0" smtClean="0">
                 <a:effectLst>
                   <a:outerShdw blurRad="38100" dist="38100" dir="2700000" algn="tl">
                     <a:srgbClr val="000000">
@@ -6812,13 +7066,22 @@
                     </a:srgbClr>
                   </a:outerShdw>
                 </a:effectLst>
+                <a:latin typeface="Raleway" panose="020B0503030101060003" pitchFamily="34" charset="0"/>
               </a:rPr>
               <a:t>Déroulement du TPI</a:t>
             </a:r>
           </a:p>
           <a:p>
-            <a:r>
-              <a:rPr lang="fr-CH" sz="2800" b="1" dirty="0" smtClean="0">
+            <a:pPr>
+              <a:buClr>
+                <a:srgbClr val="009A9C"/>
+              </a:buClr>
+              <a:buSzPct val="100000"/>
+              <a:buFont typeface="Wingdings" panose="05000000000000000000" pitchFamily="2" charset="2"/>
+              <a:buChar char="§"/>
+            </a:pPr>
+            <a:r>
+              <a:rPr lang="fr-CH" sz="3200" b="1" dirty="0" smtClean="0">
                 <a:effectLst>
                   <a:outerShdw blurRad="38100" dist="38100" dir="2700000" algn="tl">
                     <a:srgbClr val="000000">
@@ -6826,13 +7089,22 @@
                     </a:srgbClr>
                   </a:outerShdw>
                 </a:effectLst>
+                <a:latin typeface="Raleway" panose="020B0503030101060003" pitchFamily="34" charset="0"/>
               </a:rPr>
               <a:t>Comparaison du temps estimé au temps réel</a:t>
             </a:r>
           </a:p>
           <a:p>
-            <a:r>
-              <a:rPr lang="fr-CH" sz="2800" b="1" dirty="0" smtClean="0">
+            <a:pPr>
+              <a:buClr>
+                <a:srgbClr val="009A9C"/>
+              </a:buClr>
+              <a:buSzPct val="100000"/>
+              <a:buFont typeface="Wingdings" panose="05000000000000000000" pitchFamily="2" charset="2"/>
+              <a:buChar char="§"/>
+            </a:pPr>
+            <a:r>
+              <a:rPr lang="fr-CH" sz="3200" b="1" dirty="0" smtClean="0">
                 <a:effectLst>
                   <a:outerShdw blurRad="38100" dist="38100" dir="2700000" algn="tl">
                     <a:srgbClr val="000000">
@@ -6840,13 +7112,22 @@
                     </a:srgbClr>
                   </a:outerShdw>
                 </a:effectLst>
+                <a:latin typeface="Raleway" panose="020B0503030101060003" pitchFamily="34" charset="0"/>
               </a:rPr>
               <a:t>Particularité</a:t>
             </a:r>
           </a:p>
           <a:p>
-            <a:r>
-              <a:rPr lang="fr-CH" sz="2800" b="1" dirty="0" smtClean="0">
+            <a:pPr>
+              <a:buClr>
+                <a:srgbClr val="009A9C"/>
+              </a:buClr>
+              <a:buSzPct val="100000"/>
+              <a:buFont typeface="Wingdings" panose="05000000000000000000" pitchFamily="2" charset="2"/>
+              <a:buChar char="§"/>
+            </a:pPr>
+            <a:r>
+              <a:rPr lang="fr-CH" sz="3200" b="1" dirty="0" smtClean="0">
                 <a:effectLst>
                   <a:outerShdw blurRad="38100" dist="38100" dir="2700000" algn="tl">
                     <a:srgbClr val="000000">
@@ -6854,13 +7135,22 @@
                     </a:srgbClr>
                   </a:outerShdw>
                 </a:effectLst>
+                <a:latin typeface="Raleway" panose="020B0503030101060003" pitchFamily="34" charset="0"/>
               </a:rPr>
               <a:t>Difficultés</a:t>
             </a:r>
           </a:p>
           <a:p>
-            <a:r>
-              <a:rPr lang="fr-CH" sz="2800" b="1" dirty="0" smtClean="0">
+            <a:pPr>
+              <a:buClr>
+                <a:srgbClr val="009A9C"/>
+              </a:buClr>
+              <a:buSzPct val="100000"/>
+              <a:buFont typeface="Wingdings" panose="05000000000000000000" pitchFamily="2" charset="2"/>
+              <a:buChar char="§"/>
+            </a:pPr>
+            <a:r>
+              <a:rPr lang="fr-CH" sz="3200" b="1" dirty="0" smtClean="0">
                 <a:effectLst>
                   <a:outerShdw blurRad="38100" dist="38100" dir="2700000" algn="tl">
                     <a:srgbClr val="000000">
@@ -6868,13 +7158,22 @@
                     </a:srgbClr>
                   </a:outerShdw>
                 </a:effectLst>
+                <a:latin typeface="Raleway" panose="020B0503030101060003" pitchFamily="34" charset="0"/>
               </a:rPr>
               <a:t>Résultat final</a:t>
             </a:r>
           </a:p>
           <a:p>
-            <a:r>
-              <a:rPr lang="fr-CH" sz="2800" b="1" dirty="0" smtClean="0">
+            <a:pPr>
+              <a:buClr>
+                <a:srgbClr val="009A9C"/>
+              </a:buClr>
+              <a:buSzPct val="100000"/>
+              <a:buFont typeface="Wingdings" panose="05000000000000000000" pitchFamily="2" charset="2"/>
+              <a:buChar char="§"/>
+            </a:pPr>
+            <a:r>
+              <a:rPr lang="fr-CH" sz="3200" b="1" dirty="0" smtClean="0">
                 <a:effectLst>
                   <a:outerShdw blurRad="38100" dist="38100" dir="2700000" algn="tl">
                     <a:srgbClr val="000000">
@@ -6882,10 +7181,11 @@
                     </a:srgbClr>
                   </a:outerShdw>
                 </a:effectLst>
+                <a:latin typeface="Raleway" panose="020B0503030101060003" pitchFamily="34" charset="0"/>
               </a:rPr>
               <a:t>Questions?</a:t>
             </a:r>
-            <a:endParaRPr lang="fr-CH" sz="2800" b="1" dirty="0">
+            <a:endParaRPr lang="fr-CH" sz="3200" b="1" dirty="0">
               <a:effectLst>
                 <a:outerShdw blurRad="38100" dist="38100" dir="2700000" algn="tl">
                   <a:srgbClr val="000000">
@@ -6893,10 +7193,35 @@
                   </a:srgbClr>
                 </a:outerShdw>
               </a:effectLst>
+              <a:latin typeface="Raleway" panose="020B0503030101060003" pitchFamily="34" charset="0"/>
             </a:endParaRPr>
           </a:p>
         </p:txBody>
       </p:sp>
+      <p:pic>
+        <p:nvPicPr>
+          <p:cNvPr id="7" name="Image 6"/>
+          <p:cNvPicPr>
+            <a:picLocks noChangeAspect="1"/>
+          </p:cNvPicPr>
+          <p:nvPr/>
+        </p:nvPicPr>
+        <p:blipFill>
+          <a:blip r:embed="rId7"/>
+          <a:stretch>
+            <a:fillRect/>
+          </a:stretch>
+        </p:blipFill>
+        <p:spPr>
+          <a:xfrm>
+            <a:off x="11044719" y="0"/>
+            <a:ext cx="1162519" cy="1249709"/>
+          </a:xfrm>
+          <a:prstGeom prst="rect">
+            <a:avLst/>
+          </a:prstGeom>
+        </p:spPr>
+      </p:pic>
       <p:sp>
         <p:nvSpPr>
           <p:cNvPr id="4" name="Espace réservé du numéro de diapositive 3"/>
@@ -6907,13 +7232,18 @@
             <p:ph type="sldNum" sz="quarter" idx="12"/>
           </p:nvPr>
         </p:nvSpPr>
-        <p:spPr/>
+        <p:spPr>
+          <a:xfrm>
+            <a:off x="11044719" y="0"/>
+            <a:ext cx="1147281" cy="1249709"/>
+          </a:xfrm>
+        </p:spPr>
         <p:txBody>
           <a:bodyPr/>
           <a:lstStyle/>
           <a:p>
             <a:fld id="{D57F1E4F-1CFF-5643-939E-02111984F565}" type="slidenum">
-              <a:rPr lang="en-US" sz="1900" smtClean="0">
+              <a:rPr lang="en-US" sz="3000" b="1" smtClean="0">
                 <a:effectLst>
                   <a:outerShdw blurRad="38100" dist="38100" dir="2700000" algn="tl">
                     <a:srgbClr val="000000">
@@ -6921,11 +7251,12 @@
                     </a:srgbClr>
                   </a:outerShdw>
                 </a:effectLst>
+                <a:latin typeface="Raleway" panose="020B0503030101060003" pitchFamily="34" charset="0"/>
               </a:rPr>
               <a:t>2</a:t>
             </a:fld>
             <a:r>
-              <a:rPr lang="en-US" sz="1900" dirty="0" smtClean="0">
+              <a:rPr lang="en-US" sz="3000" b="1" dirty="0" smtClean="0">
                 <a:effectLst>
                   <a:outerShdw blurRad="38100" dist="38100" dir="2700000" algn="tl">
                     <a:srgbClr val="000000">
@@ -6933,10 +7264,11 @@
                     </a:srgbClr>
                   </a:outerShdw>
                 </a:effectLst>
+                <a:latin typeface="Raleway" panose="020B0503030101060003" pitchFamily="34" charset="0"/>
               </a:rPr>
               <a:t>5%</a:t>
             </a:r>
-            <a:endParaRPr lang="en-US" sz="1900" dirty="0">
+            <a:endParaRPr lang="en-US" sz="3000" b="1" dirty="0">
               <a:effectLst>
                 <a:outerShdw blurRad="38100" dist="38100" dir="2700000" algn="tl">
                   <a:srgbClr val="000000">
@@ -6944,267 +7276,7 @@
                   </a:srgbClr>
                 </a:outerShdw>
               </a:effectLst>
-            </a:endParaRPr>
-          </a:p>
-        </p:txBody>
-      </p:sp>
-      <p:sp>
-        <p:nvSpPr>
-          <p:cNvPr id="5" name="Espace réservé du contenu 2"/>
-          <p:cNvSpPr txBox="1">
-            <a:spLocks/>
-          </p:cNvSpPr>
-          <p:nvPr/>
-        </p:nvSpPr>
-        <p:spPr>
-          <a:xfrm>
-            <a:off x="-24714" y="6398641"/>
-            <a:ext cx="12192000" cy="409932"/>
-          </a:xfrm>
-          <a:prstGeom prst="rect">
-            <a:avLst/>
-          </a:prstGeom>
-        </p:spPr>
-        <p:txBody>
-          <a:bodyPr vert="horz" lIns="91440" tIns="45720" rIns="91440" bIns="45720" rtlCol="0">
-            <a:normAutofit lnSpcReduction="10000"/>
-          </a:bodyPr>
-          <a:lstStyle>
-            <a:lvl1pPr marL="342900" indent="-342900" algn="l" defTabSz="457200" rtl="0" eaLnBrk="1" latinLnBrk="0" hangingPunct="1">
-              <a:spcBef>
-                <a:spcPts val="1000"/>
-              </a:spcBef>
-              <a:spcAft>
-                <a:spcPts val="0"/>
-              </a:spcAft>
-              <a:buClr>
-                <a:schemeClr val="accent1"/>
-              </a:buClr>
-              <a:buSzPct val="80000"/>
-              <a:buFont typeface="Wingdings 3" charset="2"/>
-              <a:buChar char=""/>
-              <a:defRPr sz="2000" b="0" i="0" kern="1200">
-                <a:solidFill>
-                  <a:schemeClr val="tx1"/>
-                </a:solidFill>
-                <a:latin typeface="+mj-lt"/>
-                <a:ea typeface="+mj-ea"/>
-                <a:cs typeface="+mj-cs"/>
-              </a:defRPr>
-            </a:lvl1pPr>
-            <a:lvl2pPr marL="742950" indent="-285750" algn="l" defTabSz="457200" rtl="0" eaLnBrk="1" latinLnBrk="0" hangingPunct="1">
-              <a:spcBef>
-                <a:spcPts val="1000"/>
-              </a:spcBef>
-              <a:spcAft>
-                <a:spcPts val="0"/>
-              </a:spcAft>
-              <a:buClr>
-                <a:schemeClr val="accent1"/>
-              </a:buClr>
-              <a:buSzPct val="80000"/>
-              <a:buFont typeface="Wingdings 3" charset="2"/>
-              <a:buChar char=""/>
-              <a:defRPr sz="1800" b="0" i="0" kern="1200">
-                <a:solidFill>
-                  <a:schemeClr val="tx1"/>
-                </a:solidFill>
-                <a:latin typeface="+mj-lt"/>
-                <a:ea typeface="+mj-ea"/>
-                <a:cs typeface="+mj-cs"/>
-              </a:defRPr>
-            </a:lvl2pPr>
-            <a:lvl3pPr marL="1143000" indent="-228600" algn="l" defTabSz="457200" rtl="0" eaLnBrk="1" latinLnBrk="0" hangingPunct="1">
-              <a:spcBef>
-                <a:spcPts val="1000"/>
-              </a:spcBef>
-              <a:spcAft>
-                <a:spcPts val="0"/>
-              </a:spcAft>
-              <a:buClr>
-                <a:schemeClr val="accent1"/>
-              </a:buClr>
-              <a:buSzPct val="80000"/>
-              <a:buFont typeface="Wingdings 3" charset="2"/>
-              <a:buChar char=""/>
-              <a:defRPr sz="1600" b="0" i="0" kern="1200">
-                <a:solidFill>
-                  <a:schemeClr val="tx1"/>
-                </a:solidFill>
-                <a:latin typeface="+mj-lt"/>
-                <a:ea typeface="+mj-ea"/>
-                <a:cs typeface="+mj-cs"/>
-              </a:defRPr>
-            </a:lvl3pPr>
-            <a:lvl4pPr marL="1600200" indent="-228600" algn="l" defTabSz="457200" rtl="0" eaLnBrk="1" latinLnBrk="0" hangingPunct="1">
-              <a:spcBef>
-                <a:spcPts val="1000"/>
-              </a:spcBef>
-              <a:spcAft>
-                <a:spcPts val="0"/>
-              </a:spcAft>
-              <a:buClr>
-                <a:schemeClr val="accent1"/>
-              </a:buClr>
-              <a:buSzPct val="80000"/>
-              <a:buFont typeface="Wingdings 3" charset="2"/>
-              <a:buChar char=""/>
-              <a:defRPr sz="1400" b="0" i="0" kern="1200">
-                <a:solidFill>
-                  <a:schemeClr val="tx1"/>
-                </a:solidFill>
-                <a:latin typeface="+mj-lt"/>
-                <a:ea typeface="+mj-ea"/>
-                <a:cs typeface="+mj-cs"/>
-              </a:defRPr>
-            </a:lvl4pPr>
-            <a:lvl5pPr marL="2057400" indent="-228600" algn="l" defTabSz="457200" rtl="0" eaLnBrk="1" latinLnBrk="0" hangingPunct="1">
-              <a:spcBef>
-                <a:spcPts val="1000"/>
-              </a:spcBef>
-              <a:spcAft>
-                <a:spcPts val="0"/>
-              </a:spcAft>
-              <a:buClr>
-                <a:schemeClr val="accent1"/>
-              </a:buClr>
-              <a:buSzPct val="80000"/>
-              <a:buFont typeface="Wingdings 3" charset="2"/>
-              <a:buChar char=""/>
-              <a:defRPr sz="1400" b="0" i="0" kern="1200">
-                <a:solidFill>
-                  <a:schemeClr val="tx1"/>
-                </a:solidFill>
-                <a:latin typeface="+mj-lt"/>
-                <a:ea typeface="+mj-ea"/>
-                <a:cs typeface="+mj-cs"/>
-              </a:defRPr>
-            </a:lvl5pPr>
-            <a:lvl6pPr marL="2514600" indent="-228600" algn="l" defTabSz="457200" rtl="0" eaLnBrk="1" latinLnBrk="0" hangingPunct="1">
-              <a:spcBef>
-                <a:spcPts val="1000"/>
-              </a:spcBef>
-              <a:spcAft>
-                <a:spcPts val="0"/>
-              </a:spcAft>
-              <a:buClr>
-                <a:schemeClr val="accent1"/>
-              </a:buClr>
-              <a:buSzPct val="80000"/>
-              <a:buFont typeface="Wingdings 3" charset="2"/>
-              <a:buChar char=""/>
-              <a:defRPr sz="1400" b="0" i="0" kern="1200">
-                <a:solidFill>
-                  <a:schemeClr val="tx1"/>
-                </a:solidFill>
-                <a:latin typeface="+mj-lt"/>
-                <a:ea typeface="+mj-ea"/>
-                <a:cs typeface="+mj-cs"/>
-              </a:defRPr>
-            </a:lvl6pPr>
-            <a:lvl7pPr marL="2971800" indent="-228600" algn="l" defTabSz="457200" rtl="0" eaLnBrk="1" latinLnBrk="0" hangingPunct="1">
-              <a:spcBef>
-                <a:spcPts val="1000"/>
-              </a:spcBef>
-              <a:spcAft>
-                <a:spcPts val="0"/>
-              </a:spcAft>
-              <a:buClr>
-                <a:schemeClr val="accent1"/>
-              </a:buClr>
-              <a:buSzPct val="80000"/>
-              <a:buFont typeface="Wingdings 3" charset="2"/>
-              <a:buChar char=""/>
-              <a:defRPr sz="1400" b="0" i="0" kern="1200">
-                <a:solidFill>
-                  <a:schemeClr val="tx1"/>
-                </a:solidFill>
-                <a:latin typeface="+mj-lt"/>
-                <a:ea typeface="+mj-ea"/>
-                <a:cs typeface="+mj-cs"/>
-              </a:defRPr>
-            </a:lvl7pPr>
-            <a:lvl8pPr marL="3429000" indent="-228600" algn="l" defTabSz="457200" rtl="0" eaLnBrk="1" latinLnBrk="0" hangingPunct="1">
-              <a:spcBef>
-                <a:spcPts val="1000"/>
-              </a:spcBef>
-              <a:spcAft>
-                <a:spcPts val="0"/>
-              </a:spcAft>
-              <a:buClr>
-                <a:schemeClr val="accent1"/>
-              </a:buClr>
-              <a:buSzPct val="80000"/>
-              <a:buFont typeface="Wingdings 3" charset="2"/>
-              <a:buChar char=""/>
-              <a:defRPr sz="1400" b="0" i="0" kern="1200">
-                <a:solidFill>
-                  <a:schemeClr val="tx1"/>
-                </a:solidFill>
-                <a:latin typeface="+mj-lt"/>
-                <a:ea typeface="+mj-ea"/>
-                <a:cs typeface="+mj-cs"/>
-              </a:defRPr>
-            </a:lvl8pPr>
-            <a:lvl9pPr marL="3886200" indent="-228600" algn="l" defTabSz="457200" rtl="0" eaLnBrk="1" latinLnBrk="0" hangingPunct="1">
-              <a:spcBef>
-                <a:spcPts val="1000"/>
-              </a:spcBef>
-              <a:spcAft>
-                <a:spcPts val="0"/>
-              </a:spcAft>
-              <a:buClr>
-                <a:schemeClr val="accent1"/>
-              </a:buClr>
-              <a:buSzPct val="80000"/>
-              <a:buFont typeface="Wingdings 3" charset="2"/>
-              <a:buChar char=""/>
-              <a:defRPr sz="1400" b="0" i="0" kern="1200">
-                <a:solidFill>
-                  <a:schemeClr val="tx1"/>
-                </a:solidFill>
-                <a:latin typeface="+mj-lt"/>
-                <a:ea typeface="+mj-ea"/>
-                <a:cs typeface="+mj-cs"/>
-              </a:defRPr>
-            </a:lvl9pPr>
-          </a:lstStyle>
-          <a:p>
-            <a:pPr marL="0" indent="0" algn="r">
-              <a:buNone/>
-            </a:pPr>
-            <a:r>
-              <a:rPr lang="fr-CH" sz="2100" b="1" dirty="0" smtClean="0">
-                <a:effectLst>
-                  <a:outerShdw blurRad="38100" dist="38100" dir="2700000" algn="tl">
-                    <a:srgbClr val="000000">
-                      <a:alpha val="43137"/>
-                    </a:srgbClr>
-                  </a:outerShdw>
-                </a:effectLst>
-              </a:rPr>
-              <a:t>Note : Images altérées pour mieux ressortir au </a:t>
-            </a:r>
-            <a:r>
-              <a:rPr lang="fr-CH" sz="2100" b="1" dirty="0" err="1" smtClean="0">
-                <a:effectLst>
-                  <a:outerShdw blurRad="38100" dist="38100" dir="2700000" algn="tl">
-                    <a:srgbClr val="000000">
-                      <a:alpha val="43137"/>
-                    </a:srgbClr>
-                  </a:outerShdw>
-                </a:effectLst>
-              </a:rPr>
-              <a:t>beamer</a:t>
-            </a:r>
-            <a:endParaRPr lang="fr-CH" sz="2100" b="1" dirty="0">
-              <a:effectLst>
-                <a:outerShdw blurRad="38100" dist="38100" dir="2700000" algn="tl">
-                  <a:srgbClr val="000000">
-                    <a:alpha val="43137"/>
-                  </a:srgbClr>
-                </a:outerShdw>
-              </a:effectLst>
+              <a:latin typeface="Raleway" panose="020B0503030101060003" pitchFamily="34" charset="0"/>
             </a:endParaRPr>
           </a:p>
         </p:txBody>
@@ -7321,7 +7393,7 @@
 </file>
 
 <file path=ppt/slides/slide3.xml><?xml version="1.0" encoding="utf-8"?>
-<p:sld xmlns:a="http://schemas.openxmlformats.org/drawingml/2006/main" xmlns:r="http://schemas.openxmlformats.org/officeDocument/2006/relationships" xmlns:p="http://schemas.openxmlformats.org/presentationml/2006/main">
+<p:sld xmlns:a="http://schemas.openxmlformats.org/drawingml/2006/main" xmlns:r="http://schemas.openxmlformats.org/officeDocument/2006/relationships" xmlns:p="http://schemas.openxmlformats.org/presentationml/2006/main" showMasterSp="0">
   <p:cSld>
     <p:spTree>
       <p:nvGrpSpPr>
@@ -7337,6 +7409,38 @@
           <a:chExt cx="0" cy="0"/>
         </a:xfrm>
       </p:grpSpPr>
+      <p:pic>
+        <p:nvPicPr>
+          <p:cNvPr id="7" name="Image 6"/>
+          <p:cNvPicPr>
+            <a:picLocks noChangeAspect="1"/>
+          </p:cNvPicPr>
+          <p:nvPr/>
+        </p:nvPicPr>
+        <p:blipFill>
+          <a:blip r:embed="rId2"/>
+          <a:stretch>
+            <a:fillRect/>
+          </a:stretch>
+        </p:blipFill>
+        <p:spPr>
+          <a:xfrm>
+            <a:off x="646111" y="452718"/>
+            <a:ext cx="5128613" cy="796991"/>
+          </a:xfrm>
+          <a:prstGeom prst="rect">
+            <a:avLst/>
+          </a:prstGeom>
+          <a:effectLst>
+            <a:outerShdw dist="38100" dir="5400000" sx="1000" sy="1000" algn="t" rotWithShape="0">
+              <a:prstClr val="black">
+                <a:alpha val="0"/>
+              </a:prstClr>
+            </a:outerShdw>
+            <a:softEdge rad="0"/>
+          </a:effectLst>
+        </p:spPr>
+      </p:pic>
       <p:sp>
         <p:nvSpPr>
           <p:cNvPr id="2" name="Titre 1"/>
@@ -7361,6 +7465,7 @@
                     </a:srgbClr>
                   </a:outerShdw>
                 </a:effectLst>
+                <a:latin typeface="Raleway" panose="020B0503030101060003" pitchFamily="34" charset="0"/>
               </a:rPr>
               <a:t>Déroulement du TPI</a:t>
             </a:r>
@@ -7372,6 +7477,7 @@
                   </a:srgbClr>
                 </a:outerShdw>
               </a:effectLst>
+              <a:latin typeface="Raleway" panose="020B0503030101060003" pitchFamily="34" charset="0"/>
             </a:endParaRPr>
           </a:p>
         </p:txBody>
@@ -7388,18 +7494,26 @@
         </p:nvSpPr>
         <p:spPr>
           <a:xfrm>
-            <a:off x="1103312" y="1171464"/>
+            <a:off x="1103312" y="1278558"/>
             <a:ext cx="10087427" cy="1736487"/>
           </a:xfrm>
         </p:spPr>
         <p:txBody>
           <a:bodyPr>
-            <a:normAutofit/>
+            <a:noAutofit/>
           </a:bodyPr>
           <a:lstStyle/>
           <a:p>
-            <a:r>
-              <a:rPr lang="fr-CH" sz="2800" b="1" dirty="0" smtClean="0">
+            <a:pPr>
+              <a:buClr>
+                <a:srgbClr val="009A9C"/>
+              </a:buClr>
+              <a:buSzPct val="100000"/>
+              <a:buFont typeface="Wingdings" panose="05000000000000000000" pitchFamily="2" charset="2"/>
+              <a:buChar char="§"/>
+            </a:pPr>
+            <a:r>
+              <a:rPr lang="fr-CH" sz="3200" b="1" dirty="0" smtClean="0">
                 <a:effectLst>
                   <a:outerShdw blurRad="38100" dist="38100" dir="2700000" algn="tl">
                     <a:srgbClr val="000000">
@@ -7407,13 +7521,22 @@
                     </a:srgbClr>
                   </a:outerShdw>
                 </a:effectLst>
+                <a:latin typeface="Raleway" panose="020B0503030101060003" pitchFamily="34" charset="0"/>
               </a:rPr>
               <a:t>Gestion du stress?</a:t>
             </a:r>
           </a:p>
           <a:p>
-            <a:r>
-              <a:rPr lang="fr-CH" sz="2800" b="1" dirty="0" smtClean="0">
+            <a:pPr>
+              <a:buClr>
+                <a:srgbClr val="009A9C"/>
+              </a:buClr>
+              <a:buSzPct val="100000"/>
+              <a:buFont typeface="Wingdings" panose="05000000000000000000" pitchFamily="2" charset="2"/>
+              <a:buChar char="§"/>
+            </a:pPr>
+            <a:r>
+              <a:rPr lang="fr-CH" sz="3200" b="1" dirty="0" smtClean="0">
                 <a:effectLst>
                   <a:outerShdw blurRad="38100" dist="38100" dir="2700000" algn="tl">
                     <a:srgbClr val="000000">
@@ -7421,13 +7544,22 @@
                     </a:srgbClr>
                   </a:outerShdw>
                 </a:effectLst>
+                <a:latin typeface="Raleway" panose="020B0503030101060003" pitchFamily="34" charset="0"/>
               </a:rPr>
               <a:t>Y arriver dans les temps?</a:t>
             </a:r>
           </a:p>
           <a:p>
-            <a:r>
-              <a:rPr lang="fr-CH" sz="2800" b="1" dirty="0" smtClean="0">
+            <a:pPr>
+              <a:buClr>
+                <a:srgbClr val="009A9C"/>
+              </a:buClr>
+              <a:buSzPct val="100000"/>
+              <a:buFont typeface="Wingdings" panose="05000000000000000000" pitchFamily="2" charset="2"/>
+              <a:buChar char="§"/>
+            </a:pPr>
+            <a:r>
+              <a:rPr lang="fr-CH" sz="3200" b="1" dirty="0" smtClean="0">
                 <a:effectLst>
                   <a:outerShdw blurRad="38100" dist="38100" dir="2700000" algn="tl">
                     <a:srgbClr val="000000">
@@ -7435,6 +7567,7 @@
                     </a:srgbClr>
                   </a:outerShdw>
                 </a:effectLst>
+                <a:latin typeface="Raleway" panose="020B0503030101060003" pitchFamily="34" charset="0"/>
               </a:rPr>
               <a:t>Auto-évaluation de mes compétences?</a:t>
             </a:r>
@@ -7450,7 +7583,7 @@
           <p:nvPr/>
         </p:nvPicPr>
         <p:blipFill>
-          <a:blip r:embed="rId2">
+          <a:blip r:embed="rId3">
             <a:extLst>
               <a:ext uri="{28A0092B-C50C-407E-A947-70E740481C1C}">
                 <a14:useLocalDpi xmlns:a14="http://schemas.microsoft.com/office/drawing/2010/main" val="0"/>
@@ -7463,7 +7596,7 @@
         </p:blipFill>
         <p:spPr>
           <a:xfrm>
-            <a:off x="2914131" y="2907951"/>
+            <a:off x="2914131" y="3047997"/>
             <a:ext cx="6465787" cy="3637005"/>
           </a:xfrm>
           <a:prstGeom prst="rect">
@@ -7477,6 +7610,30 @@
           </a:effectLst>
         </p:spPr>
       </p:pic>
+      <p:pic>
+        <p:nvPicPr>
+          <p:cNvPr id="6" name="Image 5"/>
+          <p:cNvPicPr>
+            <a:picLocks noChangeAspect="1"/>
+          </p:cNvPicPr>
+          <p:nvPr/>
+        </p:nvPicPr>
+        <p:blipFill>
+          <a:blip r:embed="rId4"/>
+          <a:stretch>
+            <a:fillRect/>
+          </a:stretch>
+        </p:blipFill>
+        <p:spPr>
+          <a:xfrm>
+            <a:off x="11044719" y="0"/>
+            <a:ext cx="1162519" cy="1249709"/>
+          </a:xfrm>
+          <a:prstGeom prst="rect">
+            <a:avLst/>
+          </a:prstGeom>
+        </p:spPr>
+      </p:pic>
       <p:sp>
         <p:nvSpPr>
           <p:cNvPr id="5" name="Espace réservé du numéro de diapositive 4"/>
@@ -7487,13 +7644,18 @@
             <p:ph type="sldNum" sz="quarter" idx="12"/>
           </p:nvPr>
         </p:nvSpPr>
-        <p:spPr/>
+        <p:spPr>
+          <a:xfrm>
+            <a:off x="11044719" y="0"/>
+            <a:ext cx="1139905" cy="1249709"/>
+          </a:xfrm>
+        </p:spPr>
         <p:txBody>
           <a:bodyPr/>
           <a:lstStyle/>
           <a:p>
             <a:r>
-              <a:rPr lang="en-US" sz="1900" dirty="0" smtClean="0">
+              <a:rPr lang="en-US" sz="3000" b="1" dirty="0" smtClean="0">
                 <a:effectLst>
                   <a:outerShdw blurRad="38100" dist="38100" dir="2700000" algn="tl">
                     <a:srgbClr val="000000">
@@ -7501,10 +7663,11 @@
                     </a:srgbClr>
                   </a:outerShdw>
                 </a:effectLst>
+                <a:latin typeface="Raleway" panose="020B0503030101060003" pitchFamily="34" charset="0"/>
               </a:rPr>
               <a:t>37.5%</a:t>
             </a:r>
-            <a:endParaRPr lang="en-US" sz="1900" dirty="0">
+            <a:endParaRPr lang="en-US" sz="3000" b="1" dirty="0">
               <a:effectLst>
                 <a:outerShdw blurRad="38100" dist="38100" dir="2700000" algn="tl">
                   <a:srgbClr val="000000">
@@ -7512,6 +7675,7 @@
                   </a:srgbClr>
                 </a:outerShdw>
               </a:effectLst>
+              <a:latin typeface="Raleway" panose="020B0503030101060003" pitchFamily="34" charset="0"/>
             </a:endParaRPr>
           </a:p>
         </p:txBody>
@@ -7628,7 +7792,7 @@
 </file>
 
 <file path=ppt/slides/slide4.xml><?xml version="1.0" encoding="utf-8"?>
-<p:sld xmlns:a="http://schemas.openxmlformats.org/drawingml/2006/main" xmlns:r="http://schemas.openxmlformats.org/officeDocument/2006/relationships" xmlns:p="http://schemas.openxmlformats.org/presentationml/2006/main">
+<p:sld xmlns:a="http://schemas.openxmlformats.org/drawingml/2006/main" xmlns:r="http://schemas.openxmlformats.org/officeDocument/2006/relationships" xmlns:p="http://schemas.openxmlformats.org/presentationml/2006/main" showMasterSp="0">
   <p:cSld>
     <p:spTree>
       <p:nvGrpSpPr>
@@ -7644,6 +7808,38 @@
           <a:chExt cx="0" cy="0"/>
         </a:xfrm>
       </p:grpSpPr>
+      <p:pic>
+        <p:nvPicPr>
+          <p:cNvPr id="12" name="Image 11"/>
+          <p:cNvPicPr>
+            <a:picLocks noChangeAspect="1"/>
+          </p:cNvPicPr>
+          <p:nvPr/>
+        </p:nvPicPr>
+        <p:blipFill>
+          <a:blip r:embed="rId2"/>
+          <a:stretch>
+            <a:fillRect/>
+          </a:stretch>
+        </p:blipFill>
+        <p:spPr>
+          <a:xfrm>
+            <a:off x="646111" y="202869"/>
+            <a:ext cx="8407273" cy="1249709"/>
+          </a:xfrm>
+          <a:prstGeom prst="rect">
+            <a:avLst/>
+          </a:prstGeom>
+          <a:effectLst>
+            <a:outerShdw dist="38100" dir="5400000" sx="1000" sy="1000" algn="t" rotWithShape="0">
+              <a:prstClr val="black">
+                <a:alpha val="0"/>
+              </a:prstClr>
+            </a:outerShdw>
+            <a:softEdge rad="0"/>
+          </a:effectLst>
+        </p:spPr>
+      </p:pic>
       <p:sp>
         <p:nvSpPr>
           <p:cNvPr id="2" name="Titre 1"/>
@@ -7673,6 +7869,7 @@
                     </a:srgbClr>
                   </a:outerShdw>
                 </a:effectLst>
+                <a:latin typeface="Raleway" panose="020B0503030101060003" pitchFamily="34" charset="0"/>
               </a:rPr>
               <a:t>Comparaison du temps estimé au temps réel</a:t>
             </a:r>
@@ -7684,6 +7881,7 @@
                   </a:srgbClr>
                 </a:outerShdw>
               </a:effectLst>
+              <a:latin typeface="Raleway" panose="020B0503030101060003" pitchFamily="34" charset="0"/>
             </a:endParaRPr>
           </a:p>
         </p:txBody>
@@ -7696,7 +7894,7 @@
         </p:nvGrpSpPr>
         <p:grpSpPr>
           <a:xfrm>
-            <a:off x="3847463" y="2842496"/>
+            <a:off x="3847463" y="2949590"/>
             <a:ext cx="4434778" cy="2079169"/>
             <a:chOff x="3847463" y="2842496"/>
             <a:chExt cx="4434778" cy="2079169"/>
@@ -7791,6 +7989,14 @@
                 </a:path>
               </a:pathLst>
             </a:custGeom>
+            <a:solidFill>
+              <a:srgbClr val="009A9C"/>
+            </a:solidFill>
+            <a:ln>
+              <a:solidFill>
+                <a:schemeClr val="bg1"/>
+              </a:solidFill>
+            </a:ln>
           </p:spPr>
           <p:style>
             <a:lnRef idx="2">
@@ -7839,7 +8045,7 @@
                 </a:spcAft>
               </a:pPr>
               <a:r>
-                <a:rPr lang="fr-FR" sz="2300" b="1" kern="1200" dirty="0" smtClean="0">
+                <a:rPr lang="fr-FR" sz="2400" b="1" kern="1200" dirty="0" smtClean="0">
                   <a:effectLst>
                     <a:outerShdw blurRad="38100" dist="38100" dir="2700000" algn="tl">
                       <a:srgbClr val="000000">
@@ -7847,11 +8053,12 @@
                       </a:srgbClr>
                     </a:outerShdw>
                   </a:effectLst>
+                  <a:latin typeface="Raleway" panose="020B0503030101060003" pitchFamily="34" charset="0"/>
                 </a:rPr>
                 <a:t>Ce que j’</a:t>
               </a:r>
               <a:r>
-                <a:rPr lang="fr-FR" sz="2300" b="1" kern="1200" dirty="0" err="1" smtClean="0">
+                <a:rPr lang="fr-FR" sz="2400" b="1" kern="1200" dirty="0" err="1" smtClean="0">
                   <a:effectLst>
                     <a:outerShdw blurRad="38100" dist="38100" dir="2700000" algn="tl">
                       <a:srgbClr val="000000">
@@ -7859,10 +8066,11 @@
                       </a:srgbClr>
                     </a:outerShdw>
                   </a:effectLst>
+                  <a:latin typeface="Raleway" panose="020B0503030101060003" pitchFamily="34" charset="0"/>
                 </a:rPr>
                 <a:t>espèrais</a:t>
               </a:r>
-              <a:endParaRPr lang="fr-FR" sz="2300" b="1" kern="1200" dirty="0">
+              <a:endParaRPr lang="fr-FR" sz="2400" b="1" kern="1200" dirty="0">
                 <a:effectLst>
                   <a:outerShdw blurRad="38100" dist="38100" dir="2700000" algn="tl">
                     <a:srgbClr val="000000">
@@ -7870,6 +8078,7 @@
                     </a:srgbClr>
                   </a:outerShdw>
                 </a:effectLst>
+                <a:latin typeface="Raleway" panose="020B0503030101060003" pitchFamily="34" charset="0"/>
               </a:endParaRPr>
             </a:p>
           </p:txBody>
@@ -7963,6 +8172,14 @@
                 </a:path>
               </a:pathLst>
             </a:custGeom>
+            <a:solidFill>
+              <a:srgbClr val="009A9C"/>
+            </a:solidFill>
+            <a:ln>
+              <a:solidFill>
+                <a:schemeClr val="bg1"/>
+              </a:solidFill>
+            </a:ln>
           </p:spPr>
           <p:style>
             <a:lnRef idx="2">
@@ -8019,6 +8236,7 @@
                       </a:srgbClr>
                     </a:outerShdw>
                   </a:effectLst>
+                  <a:latin typeface="Raleway" panose="020B0503030101060003" pitchFamily="34" charset="0"/>
                 </a:rPr>
                 <a:t>La réalité</a:t>
               </a:r>
@@ -8030,6 +8248,7 @@
                     </a:srgbClr>
                   </a:outerShdw>
                 </a:effectLst>
+                <a:latin typeface="Raleway" panose="020B0503030101060003" pitchFamily="34" charset="0"/>
               </a:endParaRPr>
             </a:p>
           </p:txBody>
@@ -8044,11 +8263,14 @@
           <p:nvPr/>
         </p:nvPicPr>
         <p:blipFill rotWithShape="1">
-          <a:blip r:embed="rId2">
+          <a:blip r:embed="rId3">
             <a:extLst>
               <a:ext uri="{BEBA8EAE-BF5A-486C-A8C5-ECC9F3942E4B}">
                 <a14:imgProps xmlns:a14="http://schemas.microsoft.com/office/drawing/2010/main">
-                  <a14:imgLayer r:embed="rId3">
+                  <a14:imgLayer r:embed="rId4">
+                    <a14:imgEffect>
+                      <a14:sharpenSoften amount="30000"/>
+                    </a14:imgEffect>
                     <a14:imgEffect>
                       <a14:brightnessContrast bright="-5000"/>
                     </a14:imgEffect>
@@ -8062,7 +8284,7 @@
         </p:blipFill>
         <p:spPr>
           <a:xfrm>
-            <a:off x="263473" y="1375719"/>
+            <a:off x="263473" y="1482813"/>
             <a:ext cx="3583600" cy="5424206"/>
           </a:xfrm>
           <a:prstGeom prst="rect">
@@ -8085,11 +8307,14 @@
           <p:nvPr/>
         </p:nvPicPr>
         <p:blipFill rotWithShape="1">
-          <a:blip r:embed="rId4">
+          <a:blip r:embed="rId5">
             <a:extLst>
               <a:ext uri="{BEBA8EAE-BF5A-486C-A8C5-ECC9F3942E4B}">
                 <a14:imgProps xmlns:a14="http://schemas.microsoft.com/office/drawing/2010/main">
-                  <a14:imgLayer r:embed="rId5">
+                  <a14:imgLayer r:embed="rId6">
+                    <a14:imgEffect>
+                      <a14:sharpenSoften amount="30000"/>
+                    </a14:imgEffect>
                     <a14:imgEffect>
                       <a14:brightnessContrast bright="-10000"/>
                     </a14:imgEffect>
@@ -8103,7 +8328,7 @@
         </p:blipFill>
         <p:spPr>
           <a:xfrm>
-            <a:off x="8282633" y="1375994"/>
+            <a:off x="8282241" y="1452578"/>
             <a:ext cx="3583600" cy="5420221"/>
           </a:xfrm>
           <a:prstGeom prst="rect">
@@ -8117,6 +8342,30 @@
           </a:effectLst>
         </p:spPr>
       </p:pic>
+      <p:pic>
+        <p:nvPicPr>
+          <p:cNvPr id="11" name="Image 10"/>
+          <p:cNvPicPr>
+            <a:picLocks noChangeAspect="1"/>
+          </p:cNvPicPr>
+          <p:nvPr/>
+        </p:nvPicPr>
+        <p:blipFill>
+          <a:blip r:embed="rId7"/>
+          <a:stretch>
+            <a:fillRect/>
+          </a:stretch>
+        </p:blipFill>
+        <p:spPr>
+          <a:xfrm>
+            <a:off x="11044719" y="0"/>
+            <a:ext cx="1162519" cy="1249709"/>
+          </a:xfrm>
+          <a:prstGeom prst="rect">
+            <a:avLst/>
+          </a:prstGeom>
+        </p:spPr>
+      </p:pic>
       <p:sp>
         <p:nvSpPr>
           <p:cNvPr id="7" name="Espace réservé du numéro de diapositive 6"/>
@@ -8127,13 +8376,18 @@
             <p:ph type="sldNum" sz="quarter" idx="12"/>
           </p:nvPr>
         </p:nvSpPr>
-        <p:spPr/>
+        <p:spPr>
+          <a:xfrm>
+            <a:off x="11044719" y="0"/>
+            <a:ext cx="1147281" cy="1249709"/>
+          </a:xfrm>
+        </p:spPr>
         <p:txBody>
           <a:bodyPr/>
           <a:lstStyle/>
           <a:p>
             <a:r>
-              <a:rPr lang="en-US" sz="1900" dirty="0" smtClean="0">
+              <a:rPr lang="en-US" sz="3000" b="1" dirty="0" smtClean="0">
                 <a:effectLst>
                   <a:outerShdw blurRad="38100" dist="38100" dir="2700000" algn="tl">
                     <a:srgbClr val="000000">
@@ -8141,10 +8395,11 @@
                     </a:srgbClr>
                   </a:outerShdw>
                 </a:effectLst>
+                <a:latin typeface="Raleway" panose="020B0503030101060003" pitchFamily="34" charset="0"/>
               </a:rPr>
               <a:t>50%</a:t>
             </a:r>
-            <a:endParaRPr lang="en-US" sz="1900" dirty="0">
+            <a:endParaRPr lang="en-US" sz="3000" b="1" dirty="0">
               <a:effectLst>
                 <a:outerShdw blurRad="38100" dist="38100" dir="2700000" algn="tl">
                   <a:srgbClr val="000000">
@@ -8152,6 +8407,7 @@
                   </a:srgbClr>
                 </a:outerShdw>
               </a:effectLst>
+              <a:latin typeface="Raleway" panose="020B0503030101060003" pitchFamily="34" charset="0"/>
             </a:endParaRPr>
           </a:p>
         </p:txBody>
@@ -8461,7 +8717,7 @@
 </file>
 
 <file path=ppt/slides/slide5.xml><?xml version="1.0" encoding="utf-8"?>
-<p:sld xmlns:a="http://schemas.openxmlformats.org/drawingml/2006/main" xmlns:r="http://schemas.openxmlformats.org/officeDocument/2006/relationships" xmlns:p="http://schemas.openxmlformats.org/presentationml/2006/main">
+<p:sld xmlns:a="http://schemas.openxmlformats.org/drawingml/2006/main" xmlns:r="http://schemas.openxmlformats.org/officeDocument/2006/relationships" xmlns:p="http://schemas.openxmlformats.org/presentationml/2006/main" showMasterSp="0">
   <p:cSld>
     <p:spTree>
       <p:nvGrpSpPr>
@@ -8477,6 +8733,70 @@
           <a:chExt cx="0" cy="0"/>
         </a:xfrm>
       </p:grpSpPr>
+      <p:pic>
+        <p:nvPicPr>
+          <p:cNvPr id="10" name="Image 9"/>
+          <p:cNvPicPr>
+            <a:picLocks noChangeAspect="1"/>
+          </p:cNvPicPr>
+          <p:nvPr/>
+        </p:nvPicPr>
+        <p:blipFill>
+          <a:blip r:embed="rId2"/>
+          <a:stretch>
+            <a:fillRect/>
+          </a:stretch>
+        </p:blipFill>
+        <p:spPr>
+          <a:xfrm>
+            <a:off x="630873" y="123569"/>
+            <a:ext cx="3158532" cy="559166"/>
+          </a:xfrm>
+          <a:prstGeom prst="rect">
+            <a:avLst/>
+          </a:prstGeom>
+          <a:effectLst>
+            <a:outerShdw dist="38100" dir="5400000" sx="1000" sy="1000" algn="t" rotWithShape="0">
+              <a:prstClr val="black">
+                <a:alpha val="0"/>
+              </a:prstClr>
+            </a:outerShdw>
+            <a:softEdge rad="0"/>
+          </a:effectLst>
+        </p:spPr>
+      </p:pic>
+      <p:pic>
+        <p:nvPicPr>
+          <p:cNvPr id="9" name="Image 8"/>
+          <p:cNvPicPr>
+            <a:picLocks noChangeAspect="1"/>
+          </p:cNvPicPr>
+          <p:nvPr/>
+        </p:nvPicPr>
+        <p:blipFill>
+          <a:blip r:embed="rId2"/>
+          <a:stretch>
+            <a:fillRect/>
+          </a:stretch>
+        </p:blipFill>
+        <p:spPr>
+          <a:xfrm>
+            <a:off x="646111" y="123568"/>
+            <a:ext cx="1162519" cy="543697"/>
+          </a:xfrm>
+          <a:prstGeom prst="rect">
+            <a:avLst/>
+          </a:prstGeom>
+          <a:effectLst>
+            <a:outerShdw dist="38100" dir="5400000" sx="1000" sy="1000" algn="t" rotWithShape="0">
+              <a:prstClr val="black">
+                <a:alpha val="0"/>
+              </a:prstClr>
+            </a:outerShdw>
+            <a:softEdge rad="0"/>
+          </a:effectLst>
+        </p:spPr>
+      </p:pic>
       <p:sp>
         <p:nvSpPr>
           <p:cNvPr id="2" name="Titre 1"/>
@@ -8487,7 +8807,12 @@
             <p:ph type="title"/>
           </p:nvPr>
         </p:nvSpPr>
-        <p:spPr/>
+        <p:spPr>
+          <a:xfrm>
+            <a:off x="646111" y="32590"/>
+            <a:ext cx="9404723" cy="1400530"/>
+          </a:xfrm>
+        </p:spPr>
         <p:txBody>
           <a:bodyPr/>
           <a:lstStyle/>
@@ -8501,6 +8826,7 @@
                     </a:srgbClr>
                   </a:outerShdw>
                 </a:effectLst>
+                <a:latin typeface="Raleway" panose="020B0503030101060003" pitchFamily="34" charset="0"/>
               </a:rPr>
               <a:t>Particularité</a:t>
             </a:r>
@@ -8512,6 +8838,7 @@
                   </a:srgbClr>
                 </a:outerShdw>
               </a:effectLst>
+              <a:latin typeface="Raleway" panose="020B0503030101060003" pitchFamily="34" charset="0"/>
             </a:endParaRPr>
           </a:p>
         </p:txBody>
@@ -8528,13 +8855,13 @@
         </p:nvSpPr>
         <p:spPr>
           <a:xfrm>
-            <a:off x="646111" y="1030433"/>
+            <a:off x="646111" y="577344"/>
             <a:ext cx="8946541" cy="931190"/>
           </a:xfrm>
         </p:spPr>
         <p:txBody>
           <a:bodyPr>
-            <a:normAutofit lnSpcReduction="10000"/>
+            <a:noAutofit/>
           </a:bodyPr>
           <a:lstStyle/>
           <a:p>
@@ -8550,6 +8877,7 @@
                     </a:srgbClr>
                   </a:outerShdw>
                 </a:effectLst>
+                <a:latin typeface="Raleway" panose="020B0503030101060003" pitchFamily="34" charset="0"/>
               </a:rPr>
               <a:t>Beaucoup de choses ajoutées une fois le projet quasiment terminé</a:t>
             </a:r>
@@ -8561,6 +8889,7 @@
                   </a:srgbClr>
                 </a:outerShdw>
               </a:effectLst>
+              <a:latin typeface="Raleway" panose="020B0503030101060003" pitchFamily="34" charset="0"/>
             </a:endParaRPr>
           </a:p>
         </p:txBody>
@@ -8574,11 +8903,11 @@
           <p:nvPr/>
         </p:nvPicPr>
         <p:blipFill rotWithShape="1">
-          <a:blip r:embed="rId2">
+          <a:blip r:embed="rId3">
             <a:extLst>
               <a:ext uri="{BEBA8EAE-BF5A-486C-A8C5-ECC9F3942E4B}">
                 <a14:imgProps xmlns:a14="http://schemas.microsoft.com/office/drawing/2010/main">
-                  <a14:imgLayer r:embed="rId3">
+                  <a14:imgLayer r:embed="rId4">
                     <a14:imgEffect>
                       <a14:sharpenSoften amount="100000"/>
                     </a14:imgEffect>
@@ -8593,13 +8922,13 @@
               </a:ext>
             </a:extLst>
           </a:blip>
-          <a:srcRect l="5124" t="4268" r="4307" b="5130"/>
+          <a:srcRect l="4342" t="2383" r="3525" b="5714"/>
           <a:stretch/>
         </p:blipFill>
         <p:spPr>
           <a:xfrm>
-            <a:off x="452486" y="1961623"/>
-            <a:ext cx="5199098" cy="4654032"/>
+            <a:off x="156519" y="1524003"/>
+            <a:ext cx="5824151" cy="5198748"/>
           </a:xfrm>
           <a:prstGeom prst="roundRect">
             <a:avLst>
@@ -8645,11 +8974,11 @@
           <p:nvPr/>
         </p:nvPicPr>
         <p:blipFill rotWithShape="1">
-          <a:blip r:embed="rId4">
+          <a:blip r:embed="rId5">
             <a:extLst>
               <a:ext uri="{BEBA8EAE-BF5A-486C-A8C5-ECC9F3942E4B}">
                 <a14:imgProps xmlns:a14="http://schemas.microsoft.com/office/drawing/2010/main">
-                  <a14:imgLayer r:embed="rId5">
+                  <a14:imgLayer r:embed="rId6">
                     <a14:imgEffect>
                       <a14:sharpenSoften amount="100000"/>
                     </a14:imgEffect>
@@ -8669,7 +8998,7 @@
         </p:blipFill>
         <p:spPr>
           <a:xfrm>
-            <a:off x="6229220" y="2950948"/>
+            <a:off x="6328077" y="2688577"/>
             <a:ext cx="5592077" cy="2886075"/>
           </a:xfrm>
           <a:prstGeom prst="roundRect">
@@ -8704,6 +9033,30 @@
           </a:sp3d>
         </p:spPr>
       </p:pic>
+      <p:pic>
+        <p:nvPicPr>
+          <p:cNvPr id="8" name="Image 7"/>
+          <p:cNvPicPr>
+            <a:picLocks noChangeAspect="1"/>
+          </p:cNvPicPr>
+          <p:nvPr/>
+        </p:nvPicPr>
+        <p:blipFill>
+          <a:blip r:embed="rId7"/>
+          <a:stretch>
+            <a:fillRect/>
+          </a:stretch>
+        </p:blipFill>
+        <p:spPr>
+          <a:xfrm>
+            <a:off x="11044719" y="0"/>
+            <a:ext cx="1162519" cy="1249709"/>
+          </a:xfrm>
+          <a:prstGeom prst="rect">
+            <a:avLst/>
+          </a:prstGeom>
+        </p:spPr>
+      </p:pic>
       <p:sp>
         <p:nvSpPr>
           <p:cNvPr id="7" name="Espace réservé du numéro de diapositive 6"/>
@@ -8714,13 +9067,18 @@
             <p:ph type="sldNum" sz="quarter" idx="12"/>
           </p:nvPr>
         </p:nvSpPr>
-        <p:spPr/>
+        <p:spPr>
+          <a:xfrm>
+            <a:off x="11044719" y="0"/>
+            <a:ext cx="1147281" cy="1249709"/>
+          </a:xfrm>
+        </p:spPr>
         <p:txBody>
           <a:bodyPr/>
           <a:lstStyle/>
           <a:p>
             <a:r>
-              <a:rPr lang="en-US" sz="1900" dirty="0" smtClean="0">
+              <a:rPr lang="en-US" sz="3000" b="1" dirty="0" smtClean="0">
                 <a:effectLst>
                   <a:outerShdw blurRad="38100" dist="38100" dir="2700000" algn="tl">
                     <a:srgbClr val="000000">
@@ -8728,10 +9086,11 @@
                     </a:srgbClr>
                   </a:outerShdw>
                 </a:effectLst>
+                <a:latin typeface="Raleway" panose="020B0503030101060003" pitchFamily="34" charset="0"/>
               </a:rPr>
               <a:t>62.5%</a:t>
             </a:r>
-            <a:endParaRPr lang="en-US" sz="1900" dirty="0">
+            <a:endParaRPr lang="en-US" sz="3000" b="1" dirty="0">
               <a:effectLst>
                 <a:outerShdw blurRad="38100" dist="38100" dir="2700000" algn="tl">
                   <a:srgbClr val="000000">
@@ -8739,6 +9098,7 @@
                   </a:srgbClr>
                 </a:outerShdw>
               </a:effectLst>
+              <a:latin typeface="Raleway" panose="020B0503030101060003" pitchFamily="34" charset="0"/>
             </a:endParaRPr>
           </a:p>
         </p:txBody>
@@ -8966,7 +9326,7 @@
 </file>
 
 <file path=ppt/slides/slide6.xml><?xml version="1.0" encoding="utf-8"?>
-<p:sld xmlns:a="http://schemas.openxmlformats.org/drawingml/2006/main" xmlns:r="http://schemas.openxmlformats.org/officeDocument/2006/relationships" xmlns:p="http://schemas.openxmlformats.org/presentationml/2006/main">
+<p:sld xmlns:a="http://schemas.openxmlformats.org/drawingml/2006/main" xmlns:r="http://schemas.openxmlformats.org/officeDocument/2006/relationships" xmlns:p="http://schemas.openxmlformats.org/presentationml/2006/main" showMasterSp="0">
   <p:cSld>
     <p:spTree>
       <p:nvGrpSpPr>
@@ -8982,6 +9342,38 @@
           <a:chExt cx="0" cy="0"/>
         </a:xfrm>
       </p:grpSpPr>
+      <p:pic>
+        <p:nvPicPr>
+          <p:cNvPr id="9" name="Image 8"/>
+          <p:cNvPicPr>
+            <a:picLocks noChangeAspect="1"/>
+          </p:cNvPicPr>
+          <p:nvPr/>
+        </p:nvPicPr>
+        <p:blipFill>
+          <a:blip r:embed="rId2"/>
+          <a:stretch>
+            <a:fillRect/>
+          </a:stretch>
+        </p:blipFill>
+        <p:spPr>
+          <a:xfrm>
+            <a:off x="646111" y="156154"/>
+            <a:ext cx="2640786" cy="700265"/>
+          </a:xfrm>
+          <a:prstGeom prst="rect">
+            <a:avLst/>
+          </a:prstGeom>
+          <a:effectLst>
+            <a:outerShdw dist="38100" dir="5400000" sx="1000" sy="1000" algn="t" rotWithShape="0">
+              <a:prstClr val="black">
+                <a:alpha val="0"/>
+              </a:prstClr>
+            </a:outerShdw>
+            <a:softEdge rad="0"/>
+          </a:effectLst>
+        </p:spPr>
+      </p:pic>
       <p:sp>
         <p:nvSpPr>
           <p:cNvPr id="2" name="Titre 1"/>
@@ -8992,7 +9384,12 @@
             <p:ph type="title"/>
           </p:nvPr>
         </p:nvSpPr>
-        <p:spPr/>
+        <p:spPr>
+          <a:xfrm>
+            <a:off x="646111" y="156154"/>
+            <a:ext cx="9404723" cy="1400530"/>
+          </a:xfrm>
+        </p:spPr>
         <p:txBody>
           <a:bodyPr/>
           <a:lstStyle/>
@@ -9006,6 +9403,7 @@
                     </a:srgbClr>
                   </a:outerShdw>
                 </a:effectLst>
+                <a:latin typeface="Raleway" panose="020B0503030101060003" pitchFamily="34" charset="0"/>
               </a:rPr>
               <a:t>Difficultés</a:t>
             </a:r>
@@ -9017,6 +9415,7 @@
                   </a:srgbClr>
                 </a:outerShdw>
               </a:effectLst>
+              <a:latin typeface="Raleway" panose="020B0503030101060003" pitchFamily="34" charset="0"/>
             </a:endParaRPr>
           </a:p>
         </p:txBody>
@@ -9033,16 +9432,24 @@
         </p:nvSpPr>
         <p:spPr>
           <a:xfrm>
-            <a:off x="646111" y="1086994"/>
-            <a:ext cx="8946541" cy="4195481"/>
+            <a:off x="646111" y="848096"/>
+            <a:ext cx="10544628" cy="4195481"/>
           </a:xfrm>
         </p:spPr>
         <p:txBody>
           <a:bodyPr/>
           <a:lstStyle/>
           <a:p>
-            <a:r>
-              <a:rPr lang="fr-CH" sz="2800" b="1" dirty="0" smtClean="0">
+            <a:pPr>
+              <a:buClr>
+                <a:srgbClr val="009A9C"/>
+              </a:buClr>
+              <a:buSzPct val="100000"/>
+              <a:buFont typeface="Wingdings" panose="05000000000000000000" pitchFamily="2" charset="2"/>
+              <a:buChar char="§"/>
+            </a:pPr>
+            <a:r>
+              <a:rPr lang="fr-CH" sz="3200" b="1" dirty="0" smtClean="0">
                 <a:effectLst>
                   <a:outerShdw blurRad="38100" dist="38100" dir="2700000" algn="tl">
                     <a:srgbClr val="000000">
@@ -9050,13 +9457,22 @@
                     </a:srgbClr>
                   </a:outerShdw>
                 </a:effectLst>
+                <a:latin typeface="Raleway" panose="020B0503030101060003" pitchFamily="34" charset="0"/>
               </a:rPr>
               <a:t>CSV</a:t>
             </a:r>
           </a:p>
           <a:p>
-            <a:r>
-              <a:rPr lang="fr-CH" sz="2800" b="1" dirty="0" smtClean="0">
+            <a:pPr>
+              <a:buClr>
+                <a:srgbClr val="009A9C"/>
+              </a:buClr>
+              <a:buSzPct val="100000"/>
+              <a:buFont typeface="Wingdings" panose="05000000000000000000" pitchFamily="2" charset="2"/>
+              <a:buChar char="§"/>
+            </a:pPr>
+            <a:r>
+              <a:rPr lang="fr-CH" sz="3200" b="1" dirty="0" smtClean="0">
                 <a:effectLst>
                   <a:outerShdw blurRad="38100" dist="38100" dir="2700000" algn="tl">
                     <a:srgbClr val="000000">
@@ -9064,13 +9480,22 @@
                     </a:srgbClr>
                   </a:outerShdw>
                 </a:effectLst>
+                <a:latin typeface="Raleway" panose="020B0503030101060003" pitchFamily="34" charset="0"/>
               </a:rPr>
               <a:t>Identifier nos joueurs</a:t>
             </a:r>
           </a:p>
           <a:p>
-            <a:r>
-              <a:rPr lang="fr-CH" sz="2800" b="1" dirty="0" smtClean="0">
+            <a:pPr>
+              <a:buClr>
+                <a:srgbClr val="009A9C"/>
+              </a:buClr>
+              <a:buSzPct val="100000"/>
+              <a:buFont typeface="Wingdings" panose="05000000000000000000" pitchFamily="2" charset="2"/>
+              <a:buChar char="§"/>
+            </a:pPr>
+            <a:r>
+              <a:rPr lang="fr-CH" sz="3200" b="1" dirty="0" smtClean="0">
                 <a:effectLst>
                   <a:outerShdw blurRad="38100" dist="38100" dir="2700000" algn="tl">
                     <a:srgbClr val="000000">
@@ -9078,11 +9503,67 @@
                     </a:srgbClr>
                   </a:outerShdw>
                 </a:effectLst>
+                <a:latin typeface="Raleway" panose="020B0503030101060003" pitchFamily="34" charset="0"/>
               </a:rPr>
-              <a:t>Utiliser des sessions pour revenir où l’on en était (ou presque)</a:t>
-            </a:r>
-          </a:p>
-          <a:p>
+              <a:t>Utiliser des sessions pour revenir où l’on en </a:t>
+            </a:r>
+            <a:r>
+              <a:rPr lang="fr-CH" sz="3200" b="1" dirty="0" smtClean="0">
+                <a:effectLst>
+                  <a:outerShdw blurRad="38100" dist="38100" dir="2700000" algn="tl">
+                    <a:srgbClr val="000000">
+                      <a:alpha val="43137"/>
+                    </a:srgbClr>
+                  </a:outerShdw>
+                </a:effectLst>
+                <a:latin typeface="Raleway" panose="020B0503030101060003" pitchFamily="34" charset="0"/>
+              </a:rPr>
+              <a:t>était </a:t>
+            </a:r>
+          </a:p>
+          <a:p>
+            <a:pPr marL="0" indent="0">
+              <a:buClr>
+                <a:srgbClr val="009A9C"/>
+              </a:buClr>
+              <a:buSzPct val="100000"/>
+              <a:buNone/>
+            </a:pPr>
+            <a:r>
+              <a:rPr lang="fr-CH" sz="3200" b="1" dirty="0" smtClean="0">
+                <a:effectLst>
+                  <a:outerShdw blurRad="38100" dist="38100" dir="2700000" algn="tl">
+                    <a:srgbClr val="000000">
+                      <a:alpha val="43137"/>
+                    </a:srgbClr>
+                  </a:outerShdw>
+                </a:effectLst>
+                <a:latin typeface="Raleway" panose="020B0503030101060003" pitchFamily="34" charset="0"/>
+              </a:rPr>
+              <a:t>    (</a:t>
+            </a:r>
+            <a:r>
+              <a:rPr lang="fr-CH" sz="3200" b="1" dirty="0" smtClean="0">
+                <a:effectLst>
+                  <a:outerShdw blurRad="38100" dist="38100" dir="2700000" algn="tl">
+                    <a:srgbClr val="000000">
+                      <a:alpha val="43137"/>
+                    </a:srgbClr>
+                  </a:outerShdw>
+                </a:effectLst>
+                <a:latin typeface="Raleway" panose="020B0503030101060003" pitchFamily="34" charset="0"/>
+              </a:rPr>
+              <a:t>ou presque)</a:t>
+            </a:r>
+          </a:p>
+          <a:p>
+            <a:pPr>
+              <a:buClr>
+                <a:srgbClr val="009A9C"/>
+              </a:buClr>
+              <a:buFont typeface="Wingdings" panose="05000000000000000000" pitchFamily="2" charset="2"/>
+              <a:buChar char="§"/>
+            </a:pPr>
             <a:endParaRPr lang="fr-CH" b="1" dirty="0">
               <a:effectLst>
                 <a:outerShdw blurRad="38100" dist="38100" dir="2700000" algn="tl">
@@ -9091,6 +9572,7 @@
                   </a:srgbClr>
                 </a:outerShdw>
               </a:effectLst>
+              <a:latin typeface="Raleway" panose="020B0503030101060003" pitchFamily="34" charset="0"/>
             </a:endParaRPr>
           </a:p>
         </p:txBody>
@@ -9104,11 +9586,11 @@
           <p:nvPr/>
         </p:nvPicPr>
         <p:blipFill>
-          <a:blip r:embed="rId2">
+          <a:blip r:embed="rId3">
             <a:extLst>
               <a:ext uri="{BEBA8EAE-BF5A-486C-A8C5-ECC9F3942E4B}">
                 <a14:imgProps xmlns:a14="http://schemas.microsoft.com/office/drawing/2010/main">
-                  <a14:imgLayer r:embed="rId3">
+                  <a14:imgLayer r:embed="rId4">
                     <a14:imgEffect>
                       <a14:sharpenSoften amount="100000"/>
                     </a14:imgEffect>
@@ -9129,8 +9611,8 @@
         </p:blipFill>
         <p:spPr>
           <a:xfrm>
-            <a:off x="267170" y="3250723"/>
-            <a:ext cx="5772150" cy="2590800"/>
+            <a:off x="267170" y="3563762"/>
+            <a:ext cx="6102710" cy="2739170"/>
           </a:xfrm>
           <a:prstGeom prst="roundRect">
             <a:avLst>
@@ -9173,11 +9655,11 @@
           <p:nvPr/>
         </p:nvPicPr>
         <p:blipFill>
-          <a:blip r:embed="rId4">
+          <a:blip r:embed="rId5">
             <a:extLst>
               <a:ext uri="{BEBA8EAE-BF5A-486C-A8C5-ECC9F3942E4B}">
                 <a14:imgProps xmlns:a14="http://schemas.microsoft.com/office/drawing/2010/main">
-                  <a14:imgLayer r:embed="rId5">
+                  <a14:imgLayer r:embed="rId6">
                     <a14:imgEffect>
                       <a14:sharpenSoften amount="100000"/>
                     </a14:imgEffect>
@@ -9198,8 +9680,8 @@
         </p:blipFill>
         <p:spPr>
           <a:xfrm>
-            <a:off x="7386379" y="3234247"/>
-            <a:ext cx="3762375" cy="1409700"/>
+            <a:off x="7386379" y="3547285"/>
+            <a:ext cx="4443156" cy="1664777"/>
           </a:xfrm>
           <a:prstGeom prst="roundRect">
             <a:avLst>
@@ -9241,15 +9723,18 @@
         </p:nvSpPr>
         <p:spPr>
           <a:xfrm>
-            <a:off x="5915752" y="3217771"/>
-            <a:ext cx="2906971" cy="897924"/>
+            <a:off x="6039319" y="3547285"/>
+            <a:ext cx="3351816" cy="897924"/>
           </a:xfrm>
           <a:prstGeom prst="rightArrow">
             <a:avLst/>
           </a:prstGeom>
+          <a:solidFill>
+            <a:srgbClr val="009A9C"/>
+          </a:solidFill>
           <a:ln>
             <a:solidFill>
-              <a:schemeClr val="tx1"/>
+              <a:schemeClr val="bg1"/>
             </a:solidFill>
           </a:ln>
         </p:spPr>
@@ -9278,6 +9763,30 @@
           </a:p>
         </p:txBody>
       </p:sp>
+      <p:pic>
+        <p:nvPicPr>
+          <p:cNvPr id="8" name="Image 7"/>
+          <p:cNvPicPr>
+            <a:picLocks noChangeAspect="1"/>
+          </p:cNvPicPr>
+          <p:nvPr/>
+        </p:nvPicPr>
+        <p:blipFill>
+          <a:blip r:embed="rId7"/>
+          <a:stretch>
+            <a:fillRect/>
+          </a:stretch>
+        </p:blipFill>
+        <p:spPr>
+          <a:xfrm>
+            <a:off x="11044719" y="0"/>
+            <a:ext cx="1162519" cy="1249709"/>
+          </a:xfrm>
+          <a:prstGeom prst="rect">
+            <a:avLst/>
+          </a:prstGeom>
+        </p:spPr>
+      </p:pic>
       <p:sp>
         <p:nvSpPr>
           <p:cNvPr id="7" name="Espace réservé du numéro de diapositive 6"/>
@@ -9288,13 +9797,18 @@
             <p:ph type="sldNum" sz="quarter" idx="12"/>
           </p:nvPr>
         </p:nvSpPr>
-        <p:spPr/>
+        <p:spPr>
+          <a:xfrm>
+            <a:off x="11044719" y="0"/>
+            <a:ext cx="1162519" cy="1249709"/>
+          </a:xfrm>
+        </p:spPr>
         <p:txBody>
           <a:bodyPr/>
           <a:lstStyle/>
           <a:p>
             <a:r>
-              <a:rPr lang="en-US" sz="1900" dirty="0" smtClean="0">
+              <a:rPr lang="en-US" sz="3000" b="1" dirty="0" smtClean="0">
                 <a:effectLst>
                   <a:outerShdw blurRad="38100" dist="38100" dir="2700000" algn="tl">
                     <a:srgbClr val="000000">
@@ -9302,10 +9816,11 @@
                     </a:srgbClr>
                   </a:outerShdw>
                 </a:effectLst>
+                <a:latin typeface="Raleway" panose="020B0503030101060003" pitchFamily="34" charset="0"/>
               </a:rPr>
               <a:t>75%</a:t>
             </a:r>
-            <a:endParaRPr lang="en-US" sz="1900" dirty="0">
+            <a:endParaRPr lang="en-US" sz="3000" b="1" dirty="0">
               <a:effectLst>
                 <a:outerShdw blurRad="38100" dist="38100" dir="2700000" algn="tl">
                   <a:srgbClr val="000000">
@@ -9313,6 +9828,7 @@
                   </a:srgbClr>
                 </a:outerShdw>
               </a:effectLst>
+              <a:latin typeface="Raleway" panose="020B0503030101060003" pitchFamily="34" charset="0"/>
             </a:endParaRPr>
           </a:p>
         </p:txBody>
@@ -9625,7 +10141,7 @@
 </file>
 
 <file path=ppt/slides/slide7.xml><?xml version="1.0" encoding="utf-8"?>
-<p:sld xmlns:a="http://schemas.openxmlformats.org/drawingml/2006/main" xmlns:r="http://schemas.openxmlformats.org/officeDocument/2006/relationships" xmlns:p="http://schemas.openxmlformats.org/presentationml/2006/main">
+<p:sld xmlns:a="http://schemas.openxmlformats.org/drawingml/2006/main" xmlns:r="http://schemas.openxmlformats.org/officeDocument/2006/relationships" xmlns:p="http://schemas.openxmlformats.org/presentationml/2006/main" showMasterSp="0">
   <p:cSld>
     <p:spTree>
       <p:nvGrpSpPr>
@@ -9641,6 +10157,38 @@
           <a:chExt cx="0" cy="0"/>
         </a:xfrm>
       </p:grpSpPr>
+      <p:pic>
+        <p:nvPicPr>
+          <p:cNvPr id="8" name="Image 7"/>
+          <p:cNvPicPr>
+            <a:picLocks noChangeAspect="1"/>
+          </p:cNvPicPr>
+          <p:nvPr/>
+        </p:nvPicPr>
+        <p:blipFill>
+          <a:blip r:embed="rId2"/>
+          <a:stretch>
+            <a:fillRect/>
+          </a:stretch>
+        </p:blipFill>
+        <p:spPr>
+          <a:xfrm>
+            <a:off x="646111" y="452718"/>
+            <a:ext cx="3406905" cy="700265"/>
+          </a:xfrm>
+          <a:prstGeom prst="rect">
+            <a:avLst/>
+          </a:prstGeom>
+          <a:effectLst>
+            <a:outerShdw dist="38100" sx="1000" sy="1000" algn="t" rotWithShape="0">
+              <a:prstClr val="black">
+                <a:alpha val="0"/>
+              </a:prstClr>
+            </a:outerShdw>
+            <a:softEdge rad="0"/>
+          </a:effectLst>
+        </p:spPr>
+      </p:pic>
       <p:sp>
         <p:nvSpPr>
           <p:cNvPr id="2" name="Titre 1"/>
@@ -9665,6 +10213,7 @@
                     </a:srgbClr>
                   </a:outerShdw>
                 </a:effectLst>
+                <a:latin typeface="Raleway" panose="020B0503030101060003" pitchFamily="34" charset="0"/>
               </a:rPr>
               <a:t>Résultat final</a:t>
             </a:r>
@@ -9676,6 +10225,7 @@
                   </a:srgbClr>
                 </a:outerShdw>
               </a:effectLst>
+              <a:latin typeface="Raleway" panose="020B0503030101060003" pitchFamily="34" charset="0"/>
             </a:endParaRPr>
           </a:p>
         </p:txBody>
@@ -9692,8 +10242,8 @@
         </p:nvSpPr>
         <p:spPr>
           <a:xfrm>
-            <a:off x="646111" y="1152984"/>
-            <a:ext cx="10544628" cy="1748624"/>
+            <a:off x="646111" y="1152983"/>
+            <a:ext cx="10544628" cy="4868875"/>
           </a:xfrm>
         </p:spPr>
         <p:txBody>
@@ -9706,7 +10256,7 @@
               <a:buNone/>
             </a:pPr>
             <a:r>
-              <a:rPr lang="fr-CH" sz="2800" b="1" dirty="0" smtClean="0">
+              <a:rPr lang="fr-CH" sz="3200" b="1" dirty="0" smtClean="0">
                 <a:effectLst>
                   <a:outerShdw blurRad="38100" dist="38100" dir="2700000" algn="tl">
                     <a:srgbClr val="000000">
@@ -9714,6 +10264,7 @@
                     </a:srgbClr>
                   </a:outerShdw>
                 </a:effectLst>
+                <a:latin typeface="Raleway" panose="020B0503030101060003" pitchFamily="34" charset="0"/>
               </a:rPr>
               <a:t>Un site pour réviser ses tables de multiplications qui est fonctionnel et disponible en ligne</a:t>
             </a:r>
@@ -9722,7 +10273,7 @@
             <a:pPr marL="0" indent="0">
               <a:buNone/>
             </a:pPr>
-            <a:endParaRPr lang="fr-CH" sz="2800" b="1" dirty="0" smtClean="0">
+            <a:endParaRPr lang="fr-CH" sz="3200" b="1" dirty="0" smtClean="0">
               <a:effectLst>
                 <a:outerShdw blurRad="38100" dist="38100" dir="2700000" algn="tl">
                   <a:srgbClr val="000000">
@@ -9730,13 +10281,14 @@
                   </a:srgbClr>
                 </a:outerShdw>
               </a:effectLst>
+              <a:latin typeface="Raleway" panose="020B0503030101060003" pitchFamily="34" charset="0"/>
             </a:endParaRPr>
           </a:p>
           <a:p>
             <a:pPr marL="0" indent="0">
               <a:buNone/>
             </a:pPr>
-            <a:endParaRPr lang="fr-CH" sz="2800" b="1" dirty="0">
+            <a:endParaRPr lang="fr-CH" sz="3200" b="1" dirty="0">
               <a:effectLst>
                 <a:outerShdw blurRad="38100" dist="38100" dir="2700000" algn="tl">
                   <a:srgbClr val="000000">
@@ -9744,13 +10296,14 @@
                   </a:srgbClr>
                 </a:outerShdw>
               </a:effectLst>
+              <a:latin typeface="Raleway" panose="020B0503030101060003" pitchFamily="34" charset="0"/>
             </a:endParaRPr>
           </a:p>
           <a:p>
             <a:pPr marL="0" indent="0">
               <a:buNone/>
             </a:pPr>
-            <a:endParaRPr lang="fr-CH" sz="2800" b="1" dirty="0" smtClean="0">
+            <a:endParaRPr lang="fr-CH" sz="3200" b="1" dirty="0" smtClean="0">
               <a:effectLst>
                 <a:outerShdw blurRad="38100" dist="38100" dir="2700000" algn="tl">
                   <a:srgbClr val="000000">
@@ -9758,13 +10311,14 @@
                   </a:srgbClr>
                 </a:outerShdw>
               </a:effectLst>
+              <a:latin typeface="Raleway" panose="020B0503030101060003" pitchFamily="34" charset="0"/>
             </a:endParaRPr>
           </a:p>
           <a:p>
             <a:pPr marL="0" indent="0">
               <a:buNone/>
             </a:pPr>
-            <a:endParaRPr lang="fr-CH" sz="2800" b="1" dirty="0">
+            <a:endParaRPr lang="fr-CH" sz="3200" b="1" dirty="0">
               <a:effectLst>
                 <a:outerShdw blurRad="38100" dist="38100" dir="2700000" algn="tl">
                   <a:srgbClr val="000000">
@@ -9772,13 +10326,14 @@
                   </a:srgbClr>
                 </a:outerShdw>
               </a:effectLst>
+              <a:latin typeface="Raleway" panose="020B0503030101060003" pitchFamily="34" charset="0"/>
             </a:endParaRPr>
           </a:p>
           <a:p>
             <a:pPr marL="0" indent="0">
               <a:buNone/>
             </a:pPr>
-            <a:endParaRPr lang="fr-CH" sz="2800" b="1" dirty="0" smtClean="0">
+            <a:endParaRPr lang="fr-CH" sz="3200" b="1" dirty="0" smtClean="0">
               <a:effectLst>
                 <a:outerShdw blurRad="38100" dist="38100" dir="2700000" algn="tl">
                   <a:srgbClr val="000000">
@@ -9786,13 +10341,14 @@
                   </a:srgbClr>
                 </a:outerShdw>
               </a:effectLst>
+              <a:latin typeface="Raleway" panose="020B0503030101060003" pitchFamily="34" charset="0"/>
             </a:endParaRPr>
           </a:p>
           <a:p>
             <a:pPr marL="0" indent="0">
               <a:buNone/>
             </a:pPr>
-            <a:endParaRPr lang="fr-CH" sz="2800" b="1" dirty="0" smtClean="0">
+            <a:endParaRPr lang="fr-CH" sz="3200" b="1" dirty="0" smtClean="0">
               <a:effectLst>
                 <a:outerShdw blurRad="38100" dist="38100" dir="2700000" algn="tl">
                   <a:srgbClr val="000000">
@@ -9800,6 +10356,7 @@
                   </a:srgbClr>
                 </a:outerShdw>
               </a:effectLst>
+              <a:latin typeface="Raleway" panose="020B0503030101060003" pitchFamily="34" charset="0"/>
             </a:endParaRPr>
           </a:p>
           <a:p>
@@ -9807,7 +10364,7 @@
               <a:buNone/>
             </a:pPr>
             <a:r>
-              <a:rPr lang="fr-CH" sz="2800" b="1" dirty="0" smtClean="0">
+              <a:rPr lang="fr-CH" sz="3200" b="1" dirty="0" smtClean="0">
                 <a:effectLst>
                   <a:outerShdw blurRad="38100" dist="38100" dir="2700000" algn="tl">
                     <a:srgbClr val="000000">
@@ -9815,10 +10372,37 @@
                     </a:srgbClr>
                   </a:outerShdw>
                 </a:effectLst>
+                <a:latin typeface="Raleway" panose="020B0503030101060003" pitchFamily="34" charset="0"/>
               </a:rPr>
-              <a:t>Avec un léger bug dans le CSV... Parlons-en!</a:t>
-            </a:r>
-            <a:endParaRPr lang="fr-CH" sz="2800" b="1" dirty="0">
+              <a:t>Avec un léger bug </a:t>
+            </a:r>
+            <a:r>
+              <a:rPr lang="fr-CH" sz="3200" b="1" dirty="0" smtClean="0">
+                <a:effectLst>
+                  <a:outerShdw blurRad="38100" dist="38100" dir="2700000" algn="tl">
+                    <a:srgbClr val="000000">
+                      <a:alpha val="43137"/>
+                    </a:srgbClr>
+                  </a:outerShdw>
+                </a:effectLst>
+                <a:latin typeface="Raleway" panose="020B0503030101060003" pitchFamily="34" charset="0"/>
+              </a:rPr>
+              <a:t>au niveau du </a:t>
+            </a:r>
+            <a:r>
+              <a:rPr lang="fr-CH" sz="3200" b="1" dirty="0" smtClean="0">
+                <a:effectLst>
+                  <a:outerShdw blurRad="38100" dist="38100" dir="2700000" algn="tl">
+                    <a:srgbClr val="000000">
+                      <a:alpha val="43137"/>
+                    </a:srgbClr>
+                  </a:outerShdw>
+                </a:effectLst>
+                <a:latin typeface="Raleway" panose="020B0503030101060003" pitchFamily="34" charset="0"/>
+              </a:rPr>
+              <a:t>CSV... Parlons-en!</a:t>
+            </a:r>
+            <a:endParaRPr lang="fr-CH" sz="3200" b="1" dirty="0">
               <a:effectLst>
                 <a:outerShdw blurRad="38100" dist="38100" dir="2700000" algn="tl">
                   <a:srgbClr val="000000">
@@ -9826,6 +10410,7 @@
                   </a:srgbClr>
                 </a:outerShdw>
               </a:effectLst>
+              <a:latin typeface="Raleway" panose="020B0503030101060003" pitchFamily="34" charset="0"/>
             </a:endParaRPr>
           </a:p>
         </p:txBody>
@@ -9839,11 +10424,11 @@
           <p:nvPr/>
         </p:nvPicPr>
         <p:blipFill>
-          <a:blip r:embed="rId2">
+          <a:blip r:embed="rId3">
             <a:extLst>
               <a:ext uri="{BEBA8EAE-BF5A-486C-A8C5-ECC9F3942E4B}">
                 <a14:imgProps xmlns:a14="http://schemas.microsoft.com/office/drawing/2010/main">
-                  <a14:imgLayer r:embed="rId3">
+                  <a14:imgLayer r:embed="rId4">
                     <a14:imgEffect>
                       <a14:sharpenSoften amount="100000"/>
                     </a14:imgEffect>
@@ -9864,8 +10449,8 @@
         </p:blipFill>
         <p:spPr>
           <a:xfrm>
-            <a:off x="2966829" y="2399098"/>
-            <a:ext cx="5903192" cy="2732056"/>
+            <a:off x="2446564" y="2413691"/>
+            <a:ext cx="6969285" cy="3225455"/>
           </a:xfrm>
           <a:prstGeom prst="roundRect">
             <a:avLst>
@@ -9899,6 +10484,30 @@
           </a:sp3d>
         </p:spPr>
       </p:pic>
+      <p:pic>
+        <p:nvPicPr>
+          <p:cNvPr id="7" name="Image 6"/>
+          <p:cNvPicPr>
+            <a:picLocks noChangeAspect="1"/>
+          </p:cNvPicPr>
+          <p:nvPr/>
+        </p:nvPicPr>
+        <p:blipFill>
+          <a:blip r:embed="rId5"/>
+          <a:stretch>
+            <a:fillRect/>
+          </a:stretch>
+        </p:blipFill>
+        <p:spPr>
+          <a:xfrm>
+            <a:off x="11044719" y="0"/>
+            <a:ext cx="1162519" cy="1249709"/>
+          </a:xfrm>
+          <a:prstGeom prst="rect">
+            <a:avLst/>
+          </a:prstGeom>
+        </p:spPr>
+      </p:pic>
       <p:sp>
         <p:nvSpPr>
           <p:cNvPr id="6" name="Espace réservé du numéro de diapositive 5"/>
@@ -9909,13 +10518,18 @@
             <p:ph type="sldNum" sz="quarter" idx="12"/>
           </p:nvPr>
         </p:nvSpPr>
-        <p:spPr/>
+        <p:spPr>
+          <a:xfrm>
+            <a:off x="11044719" y="0"/>
+            <a:ext cx="1139905" cy="1249709"/>
+          </a:xfrm>
+        </p:spPr>
         <p:txBody>
           <a:bodyPr/>
           <a:lstStyle/>
           <a:p>
             <a:r>
-              <a:rPr lang="en-US" sz="1900" dirty="0" smtClean="0">
+              <a:rPr lang="en-US" sz="2900" b="1" dirty="0" smtClean="0">
                 <a:effectLst>
                   <a:outerShdw blurRad="38100" dist="38100" dir="2700000" algn="tl">
                     <a:srgbClr val="000000">
@@ -9923,11 +10537,12 @@
                     </a:srgbClr>
                   </a:outerShdw>
                 </a:effectLst>
+                <a:latin typeface="Raleway" panose="020B0503030101060003" pitchFamily="34" charset="0"/>
               </a:rPr>
               <a:t>8</a:t>
             </a:r>
             <a:fld id="{D57F1E4F-1CFF-5643-939E-02111984F565}" type="slidenum">
-              <a:rPr lang="en-US" sz="1900" smtClean="0">
+              <a:rPr lang="en-US" sz="2900" b="1" smtClean="0">
                 <a:effectLst>
                   <a:outerShdw blurRad="38100" dist="38100" dir="2700000" algn="tl">
                     <a:srgbClr val="000000">
@@ -9935,11 +10550,12 @@
                     </a:srgbClr>
                   </a:outerShdw>
                 </a:effectLst>
+                <a:latin typeface="Raleway" panose="020B0503030101060003" pitchFamily="34" charset="0"/>
               </a:rPr>
               <a:t>7</a:t>
             </a:fld>
             <a:r>
-              <a:rPr lang="en-US" sz="1900" dirty="0" smtClean="0">
+              <a:rPr lang="en-US" sz="2900" b="1" dirty="0" smtClean="0">
                 <a:effectLst>
                   <a:outerShdw blurRad="38100" dist="38100" dir="2700000" algn="tl">
                     <a:srgbClr val="000000">
@@ -9947,10 +10563,11 @@
                     </a:srgbClr>
                   </a:outerShdw>
                 </a:effectLst>
+                <a:latin typeface="Raleway" panose="020B0503030101060003" pitchFamily="34" charset="0"/>
               </a:rPr>
               <a:t>.5%</a:t>
             </a:r>
-            <a:endParaRPr lang="en-US" sz="1900" dirty="0">
+            <a:endParaRPr lang="en-US" sz="2900" b="1" dirty="0">
               <a:effectLst>
                 <a:outerShdw blurRad="38100" dist="38100" dir="2700000" algn="tl">
                   <a:srgbClr val="000000">
@@ -9958,6 +10575,7 @@
                   </a:srgbClr>
                 </a:outerShdw>
               </a:effectLst>
+              <a:latin typeface="Raleway" panose="020B0503030101060003" pitchFamily="34" charset="0"/>
             </a:endParaRPr>
           </a:p>
         </p:txBody>
@@ -10120,7 +10738,7 @@
 </file>
 
 <file path=ppt/slides/slide8.xml><?xml version="1.0" encoding="utf-8"?>
-<p:sld xmlns:a="http://schemas.openxmlformats.org/drawingml/2006/main" xmlns:r="http://schemas.openxmlformats.org/officeDocument/2006/relationships" xmlns:p="http://schemas.openxmlformats.org/presentationml/2006/main">
+<p:sld xmlns:a="http://schemas.openxmlformats.org/drawingml/2006/main" xmlns:r="http://schemas.openxmlformats.org/officeDocument/2006/relationships" xmlns:p="http://schemas.openxmlformats.org/presentationml/2006/main" showMasterSp="0">
   <p:cSld>
     <p:spTree>
       <p:nvGrpSpPr>
@@ -10136,6 +10754,38 @@
           <a:chExt cx="0" cy="0"/>
         </a:xfrm>
       </p:grpSpPr>
+      <p:pic>
+        <p:nvPicPr>
+          <p:cNvPr id="7" name="Image 6"/>
+          <p:cNvPicPr>
+            <a:picLocks noChangeAspect="1"/>
+          </p:cNvPicPr>
+          <p:nvPr/>
+        </p:nvPicPr>
+        <p:blipFill>
+          <a:blip r:embed="rId2"/>
+          <a:stretch>
+            <a:fillRect/>
+          </a:stretch>
+        </p:blipFill>
+        <p:spPr>
+          <a:xfrm>
+            <a:off x="656525" y="452718"/>
+            <a:ext cx="2902221" cy="796991"/>
+          </a:xfrm>
+          <a:prstGeom prst="rect">
+            <a:avLst/>
+          </a:prstGeom>
+          <a:effectLst>
+            <a:outerShdw dist="38100" dir="5400000" sx="1000" sy="1000" algn="t" rotWithShape="0">
+              <a:prstClr val="black">
+                <a:alpha val="0"/>
+              </a:prstClr>
+            </a:outerShdw>
+            <a:softEdge rad="0"/>
+          </a:effectLst>
+        </p:spPr>
+      </p:pic>
       <p:sp>
         <p:nvSpPr>
           <p:cNvPr id="2" name="Titre 1"/>
@@ -10165,6 +10815,7 @@
                     </a:srgbClr>
                   </a:outerShdw>
                 </a:effectLst>
+                <a:latin typeface="Raleway" panose="020B0503030101060003" pitchFamily="34" charset="0"/>
               </a:rPr>
               <a:t>Questions?</a:t>
             </a:r>
@@ -10176,6 +10827,7 @@
                   </a:srgbClr>
                 </a:outerShdw>
               </a:effectLst>
+              <a:latin typeface="Raleway" panose="020B0503030101060003" pitchFamily="34" charset="0"/>
             </a:endParaRPr>
           </a:p>
         </p:txBody>
@@ -10189,11 +10841,11 @@
           <p:nvPr/>
         </p:nvPicPr>
         <p:blipFill rotWithShape="1">
-          <a:blip r:embed="rId2">
+          <a:blip r:embed="rId3">
             <a:extLst>
               <a:ext uri="{BEBA8EAE-BF5A-486C-A8C5-ECC9F3942E4B}">
                 <a14:imgProps xmlns:a14="http://schemas.microsoft.com/office/drawing/2010/main">
-                  <a14:imgLayer r:embed="rId3">
+                  <a14:imgLayer r:embed="rId4">
                     <a14:imgEffect>
                       <a14:sharpenSoften amount="100000"/>
                     </a14:imgEffect>
@@ -10213,8 +10865,8 @@
         </p:blipFill>
         <p:spPr>
           <a:xfrm>
-            <a:off x="2426700" y="1853248"/>
-            <a:ext cx="7162143" cy="4120978"/>
+            <a:off x="1657786" y="1480372"/>
+            <a:ext cx="8521277" cy="4903001"/>
           </a:xfrm>
           <a:prstGeom prst="roundRect">
             <a:avLst>
@@ -10248,6 +10900,30 @@
           </a:sp3d>
         </p:spPr>
       </p:pic>
+      <p:pic>
+        <p:nvPicPr>
+          <p:cNvPr id="6" name="Image 5"/>
+          <p:cNvPicPr>
+            <a:picLocks noChangeAspect="1"/>
+          </p:cNvPicPr>
+          <p:nvPr/>
+        </p:nvPicPr>
+        <p:blipFill>
+          <a:blip r:embed="rId5"/>
+          <a:stretch>
+            <a:fillRect/>
+          </a:stretch>
+        </p:blipFill>
+        <p:spPr>
+          <a:xfrm>
+            <a:off x="11044719" y="0"/>
+            <a:ext cx="1162519" cy="1249709"/>
+          </a:xfrm>
+          <a:prstGeom prst="rect">
+            <a:avLst/>
+          </a:prstGeom>
+        </p:spPr>
+      </p:pic>
       <p:sp>
         <p:nvSpPr>
           <p:cNvPr id="5" name="Espace réservé du numéro de diapositive 4"/>
@@ -10258,13 +10934,18 @@
             <p:ph type="sldNum" sz="quarter" idx="12"/>
           </p:nvPr>
         </p:nvSpPr>
-        <p:spPr/>
+        <p:spPr>
+          <a:xfrm>
+            <a:off x="11044719" y="0"/>
+            <a:ext cx="1147281" cy="1249709"/>
+          </a:xfrm>
+        </p:spPr>
         <p:txBody>
           <a:bodyPr/>
           <a:lstStyle/>
           <a:p>
             <a:r>
-              <a:rPr lang="en-US" sz="1900" dirty="0" smtClean="0">
+              <a:rPr lang="en-US" sz="3000" b="1" dirty="0" smtClean="0">
                 <a:effectLst>
                   <a:outerShdw blurRad="38100" dist="38100" dir="2700000" algn="tl">
                     <a:srgbClr val="000000">
@@ -10272,10 +10953,11 @@
                     </a:srgbClr>
                   </a:outerShdw>
                 </a:effectLst>
+                <a:latin typeface="Raleway" panose="020B0503030101060003" pitchFamily="34" charset="0"/>
               </a:rPr>
               <a:t>100%</a:t>
             </a:r>
-            <a:endParaRPr lang="en-US" sz="1900" dirty="0">
+            <a:endParaRPr lang="en-US" sz="3000" b="1" dirty="0">
               <a:effectLst>
                 <a:outerShdw blurRad="38100" dist="38100" dir="2700000" algn="tl">
                   <a:srgbClr val="000000">
@@ -10283,6 +10965,7 @@
                   </a:srgbClr>
                 </a:outerShdw>
               </a:effectLst>
+              <a:latin typeface="Raleway" panose="020B0503030101060003" pitchFamily="34" charset="0"/>
             </a:endParaRPr>
           </a:p>
         </p:txBody>

</xml_diff>